<commit_message>
Aula 07 Cloud Computer 13042023
</commit_message>
<xml_diff>
--- a/01 Classes/Aula 07 - Computação em Nuvem e Web Services em Linux Cloud AZURE.pptx
+++ b/01 Classes/Aula 07 - Computação em Nuvem e Web Services em Linux Cloud AZURE.pptx
@@ -5,17 +5,19 @@
     <p:sldMasterId id="2147483648" r:id="rId1"/>
   </p:sldMasterIdLst>
   <p:notesMasterIdLst>
-    <p:notesMasterId r:id="rId10"/>
+    <p:notesMasterId r:id="rId12"/>
   </p:notesMasterIdLst>
   <p:sldIdLst>
     <p:sldId id="256" r:id="rId2"/>
     <p:sldId id="291" r:id="rId3"/>
     <p:sldId id="409" r:id="rId4"/>
-    <p:sldId id="408" r:id="rId5"/>
-    <p:sldId id="323" r:id="rId6"/>
-    <p:sldId id="334" r:id="rId7"/>
-    <p:sldId id="337" r:id="rId8"/>
-    <p:sldId id="309" r:id="rId9"/>
+    <p:sldId id="410" r:id="rId5"/>
+    <p:sldId id="411" r:id="rId6"/>
+    <p:sldId id="408" r:id="rId7"/>
+    <p:sldId id="323" r:id="rId8"/>
+    <p:sldId id="334" r:id="rId9"/>
+    <p:sldId id="337" r:id="rId10"/>
+    <p:sldId id="309" r:id="rId11"/>
   </p:sldIdLst>
   <p:sldSz cx="9144000" cy="5143500" type="screen16x9"/>
   <p:notesSz cx="6858000" cy="9144000"/>
@@ -684,7 +686,7 @@
     </p:spTree>
     <p:extLst>
       <p:ext uri="{BB962C8B-B14F-4D97-AF65-F5344CB8AC3E}">
-        <p14:creationId xmlns:p14="http://schemas.microsoft.com/office/powerpoint/2010/main" val="3886978698"/>
+        <p14:creationId xmlns:p14="http://schemas.microsoft.com/office/powerpoint/2010/main" val="887802314"/>
       </p:ext>
     </p:extLst>
   </p:cSld>
@@ -750,7 +752,7 @@
     </p:spTree>
     <p:extLst>
       <p:ext uri="{BB962C8B-B14F-4D97-AF65-F5344CB8AC3E}">
-        <p14:creationId xmlns:p14="http://schemas.microsoft.com/office/powerpoint/2010/main" val="2709569597"/>
+        <p14:creationId xmlns:p14="http://schemas.microsoft.com/office/powerpoint/2010/main" val="1606683553"/>
       </p:ext>
     </p:extLst>
   </p:cSld>
@@ -816,6 +818,138 @@
     </p:spTree>
     <p:extLst>
       <p:ext uri="{BB962C8B-B14F-4D97-AF65-F5344CB8AC3E}">
+        <p14:creationId xmlns:p14="http://schemas.microsoft.com/office/powerpoint/2010/main" val="3886978698"/>
+      </p:ext>
+    </p:extLst>
+  </p:cSld>
+  <p:clrMapOvr>
+    <a:masterClrMapping/>
+  </p:clrMapOvr>
+</p:notes>
+</file>
+
+<file path=ppt/notesSlides/notesSlide6.xml><?xml version="1.0" encoding="utf-8"?>
+<p:notes xmlns:a="http://schemas.openxmlformats.org/drawingml/2006/main" xmlns:r="http://schemas.openxmlformats.org/officeDocument/2006/relationships" xmlns:p="http://schemas.openxmlformats.org/presentationml/2006/main">
+  <p:cSld>
+    <p:spTree>
+      <p:nvGrpSpPr>
+        <p:cNvPr id="1" name=""/>
+        <p:cNvGrpSpPr/>
+        <p:nvPr/>
+      </p:nvGrpSpPr>
+      <p:grpSpPr>
+        <a:xfrm>
+          <a:off x="0" y="0"/>
+          <a:ext cx="0" cy="0"/>
+          <a:chOff x="0" y="0"/>
+          <a:chExt cx="0" cy="0"/>
+        </a:xfrm>
+      </p:grpSpPr>
+      <p:sp>
+        <p:nvSpPr>
+          <p:cNvPr id="2" name="Espaço Reservado para Imagem de Slide 1"/>
+          <p:cNvSpPr>
+            <a:spLocks noGrp="1" noRot="1" noChangeAspect="1"/>
+          </p:cNvSpPr>
+          <p:nvPr>
+            <p:ph type="sldImg"/>
+          </p:nvPr>
+        </p:nvSpPr>
+        <p:spPr>
+          <a:xfrm>
+            <a:off x="381000" y="685800"/>
+            <a:ext cx="6096000" cy="3429000"/>
+          </a:xfrm>
+        </p:spPr>
+      </p:sp>
+      <p:sp>
+        <p:nvSpPr>
+          <p:cNvPr id="3" name="Espaço Reservado para Anotações 2"/>
+          <p:cNvSpPr>
+            <a:spLocks noGrp="1"/>
+          </p:cNvSpPr>
+          <p:nvPr>
+            <p:ph type="body" idx="1"/>
+          </p:nvPr>
+        </p:nvSpPr>
+        <p:spPr/>
+        <p:txBody>
+          <a:bodyPr/>
+          <a:lstStyle/>
+          <a:p>
+            <a:endParaRPr lang="pt-BR" dirty="0"/>
+          </a:p>
+        </p:txBody>
+      </p:sp>
+    </p:spTree>
+    <p:extLst>
+      <p:ext uri="{BB962C8B-B14F-4D97-AF65-F5344CB8AC3E}">
+        <p14:creationId xmlns:p14="http://schemas.microsoft.com/office/powerpoint/2010/main" val="2709569597"/>
+      </p:ext>
+    </p:extLst>
+  </p:cSld>
+  <p:clrMapOvr>
+    <a:masterClrMapping/>
+  </p:clrMapOvr>
+</p:notes>
+</file>
+
+<file path=ppt/notesSlides/notesSlide7.xml><?xml version="1.0" encoding="utf-8"?>
+<p:notes xmlns:a="http://schemas.openxmlformats.org/drawingml/2006/main" xmlns:r="http://schemas.openxmlformats.org/officeDocument/2006/relationships" xmlns:p="http://schemas.openxmlformats.org/presentationml/2006/main">
+  <p:cSld>
+    <p:spTree>
+      <p:nvGrpSpPr>
+        <p:cNvPr id="1" name=""/>
+        <p:cNvGrpSpPr/>
+        <p:nvPr/>
+      </p:nvGrpSpPr>
+      <p:grpSpPr>
+        <a:xfrm>
+          <a:off x="0" y="0"/>
+          <a:ext cx="0" cy="0"/>
+          <a:chOff x="0" y="0"/>
+          <a:chExt cx="0" cy="0"/>
+        </a:xfrm>
+      </p:grpSpPr>
+      <p:sp>
+        <p:nvSpPr>
+          <p:cNvPr id="2" name="Espaço Reservado para Imagem de Slide 1"/>
+          <p:cNvSpPr>
+            <a:spLocks noGrp="1" noRot="1" noChangeAspect="1"/>
+          </p:cNvSpPr>
+          <p:nvPr>
+            <p:ph type="sldImg"/>
+          </p:nvPr>
+        </p:nvSpPr>
+        <p:spPr>
+          <a:xfrm>
+            <a:off x="381000" y="685800"/>
+            <a:ext cx="6096000" cy="3429000"/>
+          </a:xfrm>
+        </p:spPr>
+      </p:sp>
+      <p:sp>
+        <p:nvSpPr>
+          <p:cNvPr id="3" name="Espaço Reservado para Anotações 2"/>
+          <p:cNvSpPr>
+            <a:spLocks noGrp="1"/>
+          </p:cNvSpPr>
+          <p:nvPr>
+            <p:ph type="body" idx="1"/>
+          </p:nvPr>
+        </p:nvSpPr>
+        <p:spPr/>
+        <p:txBody>
+          <a:bodyPr/>
+          <a:lstStyle/>
+          <a:p>
+            <a:endParaRPr lang="pt-BR" dirty="0"/>
+          </a:p>
+        </p:txBody>
+      </p:sp>
+    </p:spTree>
+    <p:extLst>
+      <p:ext uri="{BB962C8B-B14F-4D97-AF65-F5344CB8AC3E}">
         <p14:creationId xmlns:p14="http://schemas.microsoft.com/office/powerpoint/2010/main" val="2296249050"/>
       </p:ext>
     </p:extLst>
@@ -826,7 +960,7 @@
 </p:notes>
 </file>
 
-<file path=ppt/notesSlides/notesSlide6.xml><?xml version="1.0" encoding="utf-8"?>
+<file path=ppt/notesSlides/notesSlide8.xml><?xml version="1.0" encoding="utf-8"?>
 <p:notes xmlns:a="http://schemas.openxmlformats.org/drawingml/2006/main" xmlns:r="http://schemas.openxmlformats.org/officeDocument/2006/relationships" xmlns:p="http://schemas.openxmlformats.org/presentationml/2006/main">
   <p:cSld>
     <p:spTree>
@@ -3844,6 +3978,476 @@
 </p:sld>
 </file>
 
+<file path=ppt/slides/slide10.xml><?xml version="1.0" encoding="utf-8"?>
+<p:sld xmlns:a="http://schemas.openxmlformats.org/drawingml/2006/main" xmlns:r="http://schemas.openxmlformats.org/officeDocument/2006/relationships" xmlns:p="http://schemas.openxmlformats.org/presentationml/2006/main">
+  <p:cSld>
+    <p:spTree>
+      <p:nvGrpSpPr>
+        <p:cNvPr id="1" name=""/>
+        <p:cNvGrpSpPr/>
+        <p:nvPr/>
+      </p:nvGrpSpPr>
+      <p:grpSpPr>
+        <a:xfrm>
+          <a:off x="0" y="0"/>
+          <a:ext cx="0" cy="0"/>
+          <a:chOff x="0" y="0"/>
+          <a:chExt cx="0" cy="0"/>
+        </a:xfrm>
+      </p:grpSpPr>
+      <p:pic>
+        <p:nvPicPr>
+          <p:cNvPr id="112" name="Picture 6" descr="Picture 6"/>
+          <p:cNvPicPr>
+            <a:picLocks noChangeAspect="1"/>
+          </p:cNvPicPr>
+          <p:nvPr/>
+        </p:nvPicPr>
+        <p:blipFill>
+          <a:blip r:embed="rId2"/>
+          <a:stretch>
+            <a:fillRect/>
+          </a:stretch>
+        </p:blipFill>
+        <p:spPr>
+          <a:xfrm>
+            <a:off x="0" y="0"/>
+            <a:ext cx="9144000" cy="5143500"/>
+          </a:xfrm>
+          <a:prstGeom prst="rect">
+            <a:avLst/>
+          </a:prstGeom>
+          <a:ln w="12700">
+            <a:miter lim="400000"/>
+            <a:headEnd/>
+            <a:tailEnd/>
+          </a:ln>
+        </p:spPr>
+      </p:pic>
+      <p:pic>
+        <p:nvPicPr>
+          <p:cNvPr id="114" name="Picture 5" descr="Picture 5"/>
+          <p:cNvPicPr>
+            <a:picLocks noChangeAspect="1"/>
+          </p:cNvPicPr>
+          <p:nvPr/>
+        </p:nvPicPr>
+        <p:blipFill>
+          <a:blip r:embed="rId3"/>
+          <a:stretch>
+            <a:fillRect/>
+          </a:stretch>
+        </p:blipFill>
+        <p:spPr>
+          <a:xfrm>
+            <a:off x="469900" y="0"/>
+            <a:ext cx="4391984" cy="171450"/>
+          </a:xfrm>
+          <a:prstGeom prst="rect">
+            <a:avLst/>
+          </a:prstGeom>
+          <a:ln w="12700">
+            <a:miter lim="400000"/>
+            <a:headEnd/>
+            <a:tailEnd/>
+          </a:ln>
+        </p:spPr>
+      </p:pic>
+      <p:sp>
+        <p:nvSpPr>
+          <p:cNvPr id="3" name="Título 2"/>
+          <p:cNvSpPr>
+            <a:spLocks noGrp="1"/>
+          </p:cNvSpPr>
+          <p:nvPr>
+            <p:ph type="title"/>
+          </p:nvPr>
+        </p:nvSpPr>
+        <p:spPr>
+          <a:xfrm>
+            <a:off x="285751" y="2386770"/>
+            <a:ext cx="8615364" cy="1102519"/>
+          </a:xfrm>
+        </p:spPr>
+        <p:txBody>
+          <a:bodyPr>
+            <a:noAutofit/>
+          </a:bodyPr>
+          <a:lstStyle/>
+          <a:p>
+            <a:r>
+              <a:rPr lang="pt-BR" sz="4800" b="1" dirty="0">
+                <a:solidFill>
+                  <a:schemeClr val="bg1"/>
+                </a:solidFill>
+              </a:rPr>
+              <a:t>Cloud Computer e </a:t>
+            </a:r>
+            <a:br>
+              <a:rPr lang="pt-BR" sz="4800" b="1" dirty="0">
+                <a:solidFill>
+                  <a:schemeClr val="bg1"/>
+                </a:solidFill>
+              </a:rPr>
+            </a:br>
+            <a:r>
+              <a:rPr lang="pt-BR" sz="4800" b="1" dirty="0">
+                <a:solidFill>
+                  <a:schemeClr val="bg1"/>
+                </a:solidFill>
+              </a:rPr>
+              <a:t>Web Services em Linux</a:t>
+            </a:r>
+          </a:p>
+        </p:txBody>
+      </p:sp>
+      <p:sp>
+        <p:nvSpPr>
+          <p:cNvPr id="6" name="Título 2"/>
+          <p:cNvSpPr txBox="1"/>
+          <p:nvPr/>
+        </p:nvSpPr>
+        <p:spPr>
+          <a:xfrm>
+            <a:off x="975683" y="3866663"/>
+            <a:ext cx="7772400" cy="1102519"/>
+          </a:xfrm>
+          <a:prstGeom prst="rect">
+            <a:avLst/>
+          </a:prstGeom>
+          <a:ln w="12700">
+            <a:miter lim="400000"/>
+          </a:ln>
+        </p:spPr>
+        <p:txBody>
+          <a:bodyPr lIns="45718" tIns="45718" rIns="45718" bIns="45718" anchor="ctr">
+            <a:noAutofit/>
+          </a:bodyPr>
+          <a:lstStyle>
+            <a:lvl1pPr marL="0" marR="0" indent="0" algn="ctr" defTabSz="457200" rtl="0" latinLnBrk="0">
+              <a:lnSpc>
+                <a:spcPct val="100000"/>
+              </a:lnSpc>
+              <a:spcBef>
+                <a:spcPts val="0"/>
+              </a:spcBef>
+              <a:spcAft>
+                <a:spcPts val="0"/>
+              </a:spcAft>
+              <a:buClrTx/>
+              <a:buSzTx/>
+              <a:buFontTx/>
+              <a:buNone/>
+              <a:defRPr sz="4400" b="0" i="0" u="none" strike="noStrike" cap="none" spc="0" baseline="0">
+                <a:ln>
+                  <a:noFill/>
+                </a:ln>
+                <a:solidFill>
+                  <a:srgbClr val="000000"/>
+                </a:solidFill>
+                <a:uFillTx/>
+                <a:latin typeface="+mj-lt"/>
+                <a:ea typeface="+mj-ea"/>
+                <a:cs typeface="+mj-cs"/>
+                <a:sym typeface="Calibri"/>
+              </a:defRPr>
+            </a:lvl1pPr>
+            <a:lvl2pPr marL="0" marR="0" indent="0" algn="ctr" defTabSz="457200" rtl="0" latinLnBrk="0">
+              <a:lnSpc>
+                <a:spcPct val="100000"/>
+              </a:lnSpc>
+              <a:spcBef>
+                <a:spcPts val="0"/>
+              </a:spcBef>
+              <a:spcAft>
+                <a:spcPts val="0"/>
+              </a:spcAft>
+              <a:buClrTx/>
+              <a:buSzTx/>
+              <a:buFontTx/>
+              <a:buNone/>
+              <a:defRPr sz="4400" b="0" i="0" u="none" strike="noStrike" cap="none" spc="0" baseline="0">
+                <a:ln>
+                  <a:noFill/>
+                </a:ln>
+                <a:solidFill>
+                  <a:srgbClr val="000000"/>
+                </a:solidFill>
+                <a:uFillTx/>
+                <a:latin typeface="+mj-lt"/>
+                <a:ea typeface="+mj-ea"/>
+                <a:cs typeface="+mj-cs"/>
+                <a:sym typeface="Calibri"/>
+              </a:defRPr>
+            </a:lvl2pPr>
+            <a:lvl3pPr marL="0" marR="0" indent="0" algn="ctr" defTabSz="457200" rtl="0" latinLnBrk="0">
+              <a:lnSpc>
+                <a:spcPct val="100000"/>
+              </a:lnSpc>
+              <a:spcBef>
+                <a:spcPts val="0"/>
+              </a:spcBef>
+              <a:spcAft>
+                <a:spcPts val="0"/>
+              </a:spcAft>
+              <a:buClrTx/>
+              <a:buSzTx/>
+              <a:buFontTx/>
+              <a:buNone/>
+              <a:defRPr sz="4400" b="0" i="0" u="none" strike="noStrike" cap="none" spc="0" baseline="0">
+                <a:ln>
+                  <a:noFill/>
+                </a:ln>
+                <a:solidFill>
+                  <a:srgbClr val="000000"/>
+                </a:solidFill>
+                <a:uFillTx/>
+                <a:latin typeface="+mj-lt"/>
+                <a:ea typeface="+mj-ea"/>
+                <a:cs typeface="+mj-cs"/>
+                <a:sym typeface="Calibri"/>
+              </a:defRPr>
+            </a:lvl3pPr>
+            <a:lvl4pPr marL="0" marR="0" indent="0" algn="ctr" defTabSz="457200" rtl="0" latinLnBrk="0">
+              <a:lnSpc>
+                <a:spcPct val="100000"/>
+              </a:lnSpc>
+              <a:spcBef>
+                <a:spcPts val="0"/>
+              </a:spcBef>
+              <a:spcAft>
+                <a:spcPts val="0"/>
+              </a:spcAft>
+              <a:buClrTx/>
+              <a:buSzTx/>
+              <a:buFontTx/>
+              <a:buNone/>
+              <a:defRPr sz="4400" b="0" i="0" u="none" strike="noStrike" cap="none" spc="0" baseline="0">
+                <a:ln>
+                  <a:noFill/>
+                </a:ln>
+                <a:solidFill>
+                  <a:srgbClr val="000000"/>
+                </a:solidFill>
+                <a:uFillTx/>
+                <a:latin typeface="+mj-lt"/>
+                <a:ea typeface="+mj-ea"/>
+                <a:cs typeface="+mj-cs"/>
+                <a:sym typeface="Calibri"/>
+              </a:defRPr>
+            </a:lvl4pPr>
+            <a:lvl5pPr marL="0" marR="0" indent="0" algn="ctr" defTabSz="457200" rtl="0" latinLnBrk="0">
+              <a:lnSpc>
+                <a:spcPct val="100000"/>
+              </a:lnSpc>
+              <a:spcBef>
+                <a:spcPts val="0"/>
+              </a:spcBef>
+              <a:spcAft>
+                <a:spcPts val="0"/>
+              </a:spcAft>
+              <a:buClrTx/>
+              <a:buSzTx/>
+              <a:buFontTx/>
+              <a:buNone/>
+              <a:defRPr sz="4400" b="0" i="0" u="none" strike="noStrike" cap="none" spc="0" baseline="0">
+                <a:ln>
+                  <a:noFill/>
+                </a:ln>
+                <a:solidFill>
+                  <a:srgbClr val="000000"/>
+                </a:solidFill>
+                <a:uFillTx/>
+                <a:latin typeface="+mj-lt"/>
+                <a:ea typeface="+mj-ea"/>
+                <a:cs typeface="+mj-cs"/>
+                <a:sym typeface="Calibri"/>
+              </a:defRPr>
+            </a:lvl5pPr>
+            <a:lvl6pPr marL="0" marR="0" indent="0" algn="ctr" defTabSz="457200" rtl="0" latinLnBrk="0">
+              <a:lnSpc>
+                <a:spcPct val="100000"/>
+              </a:lnSpc>
+              <a:spcBef>
+                <a:spcPts val="0"/>
+              </a:spcBef>
+              <a:spcAft>
+                <a:spcPts val="0"/>
+              </a:spcAft>
+              <a:buClrTx/>
+              <a:buSzTx/>
+              <a:buFontTx/>
+              <a:buNone/>
+              <a:defRPr sz="4400" b="0" i="0" u="none" strike="noStrike" cap="none" spc="0" baseline="0">
+                <a:ln>
+                  <a:noFill/>
+                </a:ln>
+                <a:solidFill>
+                  <a:srgbClr val="000000"/>
+                </a:solidFill>
+                <a:uFillTx/>
+                <a:latin typeface="+mj-lt"/>
+                <a:ea typeface="+mj-ea"/>
+                <a:cs typeface="+mj-cs"/>
+                <a:sym typeface="Calibri"/>
+              </a:defRPr>
+            </a:lvl6pPr>
+            <a:lvl7pPr marL="0" marR="0" indent="0" algn="ctr" defTabSz="457200" rtl="0" latinLnBrk="0">
+              <a:lnSpc>
+                <a:spcPct val="100000"/>
+              </a:lnSpc>
+              <a:spcBef>
+                <a:spcPts val="0"/>
+              </a:spcBef>
+              <a:spcAft>
+                <a:spcPts val="0"/>
+              </a:spcAft>
+              <a:buClrTx/>
+              <a:buSzTx/>
+              <a:buFontTx/>
+              <a:buNone/>
+              <a:defRPr sz="4400" b="0" i="0" u="none" strike="noStrike" cap="none" spc="0" baseline="0">
+                <a:ln>
+                  <a:noFill/>
+                </a:ln>
+                <a:solidFill>
+                  <a:srgbClr val="000000"/>
+                </a:solidFill>
+                <a:uFillTx/>
+                <a:latin typeface="+mj-lt"/>
+                <a:ea typeface="+mj-ea"/>
+                <a:cs typeface="+mj-cs"/>
+                <a:sym typeface="Calibri"/>
+              </a:defRPr>
+            </a:lvl7pPr>
+            <a:lvl8pPr marL="0" marR="0" indent="0" algn="ctr" defTabSz="457200" rtl="0" latinLnBrk="0">
+              <a:lnSpc>
+                <a:spcPct val="100000"/>
+              </a:lnSpc>
+              <a:spcBef>
+                <a:spcPts val="0"/>
+              </a:spcBef>
+              <a:spcAft>
+                <a:spcPts val="0"/>
+              </a:spcAft>
+              <a:buClrTx/>
+              <a:buSzTx/>
+              <a:buFontTx/>
+              <a:buNone/>
+              <a:defRPr sz="4400" b="0" i="0" u="none" strike="noStrike" cap="none" spc="0" baseline="0">
+                <a:ln>
+                  <a:noFill/>
+                </a:ln>
+                <a:solidFill>
+                  <a:srgbClr val="000000"/>
+                </a:solidFill>
+                <a:uFillTx/>
+                <a:latin typeface="+mj-lt"/>
+                <a:ea typeface="+mj-ea"/>
+                <a:cs typeface="+mj-cs"/>
+                <a:sym typeface="Calibri"/>
+              </a:defRPr>
+            </a:lvl8pPr>
+            <a:lvl9pPr marL="0" marR="0" indent="0" algn="ctr" defTabSz="457200" rtl="0" latinLnBrk="0">
+              <a:lnSpc>
+                <a:spcPct val="100000"/>
+              </a:lnSpc>
+              <a:spcBef>
+                <a:spcPts val="0"/>
+              </a:spcBef>
+              <a:spcAft>
+                <a:spcPts val="0"/>
+              </a:spcAft>
+              <a:buClrTx/>
+              <a:buSzTx/>
+              <a:buFontTx/>
+              <a:buNone/>
+              <a:defRPr sz="4400" b="0" i="0" u="none" strike="noStrike" cap="none" spc="0" baseline="0">
+                <a:ln>
+                  <a:noFill/>
+                </a:ln>
+                <a:solidFill>
+                  <a:srgbClr val="000000"/>
+                </a:solidFill>
+                <a:uFillTx/>
+                <a:latin typeface="+mj-lt"/>
+                <a:ea typeface="+mj-ea"/>
+                <a:cs typeface="+mj-cs"/>
+                <a:sym typeface="Calibri"/>
+              </a:defRPr>
+            </a:lvl9pPr>
+          </a:lstStyle>
+          <a:p>
+            <a:pPr algn="r" hangingPunct="1"/>
+            <a:r>
+              <a:rPr lang="pt-BR" sz="2000" b="1" dirty="0">
+                <a:solidFill>
+                  <a:schemeClr val="bg1"/>
+                </a:solidFill>
+              </a:rPr>
+              <a:t>Professor </a:t>
+            </a:r>
+            <a:r>
+              <a:rPr lang="pt-BR" sz="2000" b="1">
+                <a:solidFill>
+                  <a:schemeClr val="bg1"/>
+                </a:solidFill>
+              </a:rPr>
+              <a:t>M.Sc</a:t>
+            </a:r>
+            <a:r>
+              <a:rPr lang="pt-BR" sz="2000" b="1" dirty="0">
+                <a:solidFill>
+                  <a:schemeClr val="bg1"/>
+                </a:solidFill>
+              </a:rPr>
+              <a:t>. Heleno Cardoso</a:t>
+            </a:r>
+          </a:p>
+        </p:txBody>
+      </p:sp>
+      <p:pic>
+        <p:nvPicPr>
+          <p:cNvPr id="2" name="Google Shape;62;p1" descr="Imagem">
+            <a:extLst>
+              <a:ext uri="{FF2B5EF4-FFF2-40B4-BE49-F238E27FC236}">
+                <a16:creationId xmlns:a16="http://schemas.microsoft.com/office/drawing/2014/main" id="{9C895622-2963-024D-634E-EA58F5381D06}"/>
+              </a:ext>
+            </a:extLst>
+          </p:cNvPr>
+          <p:cNvPicPr preferRelativeResize="0"/>
+          <p:nvPr/>
+        </p:nvPicPr>
+        <p:blipFill rotWithShape="1">
+          <a:blip r:embed="rId4">
+            <a:alphaModFix/>
+          </a:blip>
+          <a:srcRect/>
+          <a:stretch/>
+        </p:blipFill>
+        <p:spPr>
+          <a:xfrm>
+            <a:off x="469898" y="343798"/>
+            <a:ext cx="2858518" cy="1338697"/>
+          </a:xfrm>
+          <a:prstGeom prst="rect">
+            <a:avLst/>
+          </a:prstGeom>
+          <a:noFill/>
+          <a:ln>
+            <a:noFill/>
+          </a:ln>
+        </p:spPr>
+      </p:pic>
+    </p:spTree>
+  </p:cSld>
+  <p:clrMapOvr>
+    <a:masterClrMapping/>
+  </p:clrMapOvr>
+  <p:transition spd="med"/>
+</p:sld>
+</file>
+
 <file path=ppt/slides/slide2.xml><?xml version="1.0" encoding="utf-8"?>
 <p:sld xmlns:a="http://schemas.openxmlformats.org/drawingml/2006/main" xmlns:r="http://schemas.openxmlformats.org/officeDocument/2006/relationships" xmlns:p="http://schemas.openxmlformats.org/presentationml/2006/main">
   <p:cSld>
@@ -3978,7 +4582,7 @@
                   <a:schemeClr val="bg1"/>
                 </a:solidFill>
               </a:rPr>
-              <a:t>Cloud Computer na Prática</a:t>
+              <a:t>Cloud Computer Microsoft AZURE</a:t>
             </a:r>
           </a:p>
         </p:txBody>
@@ -4375,7 +4979,7 @@
                   <a:srgbClr val="0070C0"/>
                 </a:solidFill>
               </a:rPr>
-              <a:t>Amazon AZURE</a:t>
+              <a:t>Microsoft AZURE</a:t>
             </a:r>
           </a:p>
         </p:txBody>
@@ -4413,7 +5017,47 @@
                 <a:latin typeface="Times" panose="02020603050405020304" pitchFamily="18" charset="0"/>
                 <a:cs typeface="Times" panose="02020603050405020304" pitchFamily="18" charset="0"/>
               </a:rPr>
-              <a:t>g</a:t>
+              <a:t>Plataforma de nuvem pública de serviços de cloud </a:t>
+            </a:r>
+            <a:r>
+              <a:rPr lang="pt-BR" sz="2400" dirty="0" err="1">
+                <a:solidFill>
+                  <a:schemeClr val="tx1"/>
+                </a:solidFill>
+                <a:latin typeface="Times" panose="02020603050405020304" pitchFamily="18" charset="0"/>
+                <a:cs typeface="Times" panose="02020603050405020304" pitchFamily="18" charset="0"/>
+              </a:rPr>
+              <a:t>computing</a:t>
+            </a:r>
+            <a:r>
+              <a:rPr lang="pt-BR" sz="2400" dirty="0">
+                <a:solidFill>
+                  <a:schemeClr val="tx1"/>
+                </a:solidFill>
+                <a:latin typeface="Times" panose="02020603050405020304" pitchFamily="18" charset="0"/>
+                <a:cs typeface="Times" panose="02020603050405020304" pitchFamily="18" charset="0"/>
+              </a:rPr>
+              <a:t> oferecida pela </a:t>
+            </a:r>
+            <a:r>
+              <a:rPr lang="pt-BR" sz="2400" b="1" dirty="0">
+                <a:solidFill>
+                  <a:schemeClr val="tx1"/>
+                </a:solidFill>
+                <a:latin typeface="Times" panose="02020603050405020304" pitchFamily="18" charset="0"/>
+                <a:cs typeface="Times" panose="02020603050405020304" pitchFamily="18" charset="0"/>
+              </a:rPr>
+              <a:t>AZURE</a:t>
+            </a:r>
+            <a:r>
+              <a:rPr lang="pt-BR" sz="2400" dirty="0">
+                <a:solidFill>
+                  <a:schemeClr val="tx1"/>
+                </a:solidFill>
+                <a:latin typeface="Times" panose="02020603050405020304" pitchFamily="18" charset="0"/>
+                <a:cs typeface="Times" panose="02020603050405020304" pitchFamily="18" charset="0"/>
+              </a:rPr>
+              <a:t>. </a:t>
             </a:r>
           </a:p>
           <a:p>
@@ -4429,11 +5073,136 @@
             </a:endParaRPr>
           </a:p>
           <a:p>
-            <a:pPr algn="just">
-              <a:buFont typeface="Wingdings" panose="05000000000000000000" pitchFamily="2" charset="2"/>
-              <a:buChar char="§"/>
+            <a:pPr marL="0" indent="0" algn="just">
+              <a:buNone/>
             </a:pPr>
-            <a:endParaRPr lang="pt-BR" sz="1800" b="1" dirty="0">
+            <a:r>
+              <a:rPr lang="pt-BR" sz="2400" dirty="0">
+                <a:solidFill>
+                  <a:schemeClr val="tx1"/>
+                </a:solidFill>
+                <a:latin typeface="Times" panose="02020603050405020304" pitchFamily="18" charset="0"/>
+                <a:cs typeface="Times" panose="02020603050405020304" pitchFamily="18" charset="0"/>
+              </a:rPr>
+              <a:t>O que é Azure e para que serve?</a:t>
+            </a:r>
+          </a:p>
+          <a:p>
+            <a:pPr marL="0" indent="0" algn="just">
+              <a:buNone/>
+            </a:pPr>
+            <a:r>
+              <a:rPr lang="pt-BR" sz="2400" dirty="0">
+                <a:solidFill>
+                  <a:schemeClr val="tx1"/>
+                </a:solidFill>
+                <a:latin typeface="Times" panose="02020603050405020304" pitchFamily="18" charset="0"/>
+                <a:cs typeface="Times" panose="02020603050405020304" pitchFamily="18" charset="0"/>
+              </a:rPr>
+              <a:t>Oferece uma ampla coleção de serviços, incluindo PaaS, IaaS, SaaS, </a:t>
+            </a:r>
+            <a:r>
+              <a:rPr lang="pt-BR" sz="2400" dirty="0" err="1">
+                <a:solidFill>
+                  <a:schemeClr val="tx1"/>
+                </a:solidFill>
+                <a:latin typeface="Times" panose="02020603050405020304" pitchFamily="18" charset="0"/>
+                <a:cs typeface="Times" panose="02020603050405020304" pitchFamily="18" charset="0"/>
+              </a:rPr>
+              <a:t>DBaaS</a:t>
+            </a:r>
+            <a:r>
+              <a:rPr lang="pt-BR" sz="2400" dirty="0">
+                <a:solidFill>
+                  <a:schemeClr val="tx1"/>
+                </a:solidFill>
+                <a:latin typeface="Times" panose="02020603050405020304" pitchFamily="18" charset="0"/>
+                <a:cs typeface="Times" panose="02020603050405020304" pitchFamily="18" charset="0"/>
+              </a:rPr>
+              <a:t> e funcionalidades de serviços de bancos de dados gerenciados.</a:t>
+            </a:r>
+          </a:p>
+          <a:p>
+            <a:pPr marL="0" indent="0" algn="just">
+              <a:buNone/>
+            </a:pPr>
+            <a:endParaRPr lang="pt-BR" sz="2400" dirty="0">
+              <a:solidFill>
+                <a:schemeClr val="tx1"/>
+              </a:solidFill>
+              <a:latin typeface="Times" panose="02020603050405020304" pitchFamily="18" charset="0"/>
+              <a:cs typeface="Times" panose="02020603050405020304" pitchFamily="18" charset="0"/>
+            </a:endParaRPr>
+          </a:p>
+          <a:p>
+            <a:pPr marL="0" indent="0" algn="just">
+              <a:buNone/>
+            </a:pPr>
+            <a:r>
+              <a:rPr lang="pt-BR" sz="2400" dirty="0">
+                <a:solidFill>
+                  <a:schemeClr val="tx1"/>
+                </a:solidFill>
+                <a:latin typeface="Times" panose="02020603050405020304" pitchFamily="18" charset="0"/>
+                <a:cs typeface="Times" panose="02020603050405020304" pitchFamily="18" charset="0"/>
+              </a:rPr>
+              <a:t>	</a:t>
+            </a:r>
+            <a:r>
+              <a:rPr lang="pt-BR" sz="2400" dirty="0">
+                <a:solidFill>
+                  <a:schemeClr val="tx1"/>
+                </a:solidFill>
+                <a:latin typeface="Times" panose="02020603050405020304" pitchFamily="18" charset="0"/>
+                <a:cs typeface="Times" panose="02020603050405020304" pitchFamily="18" charset="0"/>
+                <a:hlinkClick r:id="rId3"/>
+              </a:rPr>
+              <a:t>https://azure.microsoft.com/</a:t>
+            </a:r>
+            <a:endParaRPr lang="pt-BR" sz="2400" dirty="0">
+              <a:solidFill>
+                <a:schemeClr val="tx1"/>
+              </a:solidFill>
+              <a:latin typeface="Times" panose="02020603050405020304" pitchFamily="18" charset="0"/>
+              <a:cs typeface="Times" panose="02020603050405020304" pitchFamily="18" charset="0"/>
+            </a:endParaRPr>
+          </a:p>
+          <a:p>
+            <a:pPr marL="0" indent="0" algn="just">
+              <a:buNone/>
+            </a:pPr>
+            <a:r>
+              <a:rPr lang="pt-BR" sz="2400" b="1" dirty="0">
+                <a:solidFill>
+                  <a:schemeClr val="tx1"/>
+                </a:solidFill>
+                <a:latin typeface="Times" panose="02020603050405020304" pitchFamily="18" charset="0"/>
+                <a:cs typeface="Times" panose="02020603050405020304" pitchFamily="18" charset="0"/>
+              </a:rPr>
+              <a:t>	</a:t>
+            </a:r>
+            <a:r>
+              <a:rPr lang="pt-BR" sz="2400" dirty="0">
+                <a:solidFill>
+                  <a:schemeClr val="tx1"/>
+                </a:solidFill>
+                <a:latin typeface="Times" panose="02020603050405020304" pitchFamily="18" charset="0"/>
+                <a:cs typeface="Times" panose="02020603050405020304" pitchFamily="18" charset="0"/>
+                <a:hlinkClick r:id="rId4"/>
+              </a:rPr>
+              <a:t>https://azurecharts.com/</a:t>
+            </a:r>
+            <a:r>
+              <a:rPr lang="pt-BR" sz="2400" dirty="0">
+                <a:solidFill>
+                  <a:schemeClr val="tx1"/>
+                </a:solidFill>
+                <a:latin typeface="Times" panose="02020603050405020304" pitchFamily="18" charset="0"/>
+                <a:cs typeface="Times" panose="02020603050405020304" pitchFamily="18" charset="0"/>
+              </a:rPr>
+              <a:t> </a:t>
+            </a:r>
+            <a:endParaRPr lang="pt-BR" sz="1800" dirty="0">
               <a:solidFill>
                 <a:srgbClr val="FF0000"/>
               </a:solidFill>
@@ -4502,7 +5271,7 @@
                   <a:srgbClr val="0070C0"/>
                 </a:solidFill>
               </a:rPr>
-              <a:t>Leitura</a:t>
+              <a:t>Recursos</a:t>
             </a:r>
             <a:r>
               <a:rPr lang="en-US" b="1" dirty="0">
@@ -4518,13 +5287,16 @@
                   <a:srgbClr val="0070C0"/>
                 </a:solidFill>
               </a:rPr>
-              <a:t>Específica</a:t>
-            </a:r>
-            <a:endParaRPr lang="en-US" b="1" dirty="0">
-              <a:solidFill>
-                <a:srgbClr val="0070C0"/>
-              </a:solidFill>
-            </a:endParaRPr>
+              <a:t>Computacionais</a:t>
+            </a:r>
+            <a:r>
+              <a:rPr lang="en-US" b="1" dirty="0">
+                <a:solidFill>
+                  <a:srgbClr val="0070C0"/>
+                </a:solidFill>
+              </a:rPr>
+              <a:t> AZURE</a:t>
+            </a:r>
           </a:p>
         </p:txBody>
       </p:sp>
@@ -4540,8 +5312,8 @@
         </p:nvSpPr>
         <p:spPr>
           <a:xfrm>
-            <a:off x="142865" y="1200151"/>
-            <a:ext cx="8865056" cy="3394472"/>
+            <a:off x="139472" y="921562"/>
+            <a:ext cx="8865056" cy="4181106"/>
           </a:xfrm>
         </p:spPr>
         <p:txBody>
@@ -4553,127 +5325,50 @@
             <a:pPr marL="0" indent="0" algn="just">
               <a:buNone/>
             </a:pPr>
-            <a:r>
-              <a:rPr lang="pt-BR" sz="2000" dirty="0">
-                <a:latin typeface="Times New Roman" panose="02020603050405020304" pitchFamily="18" charset="0"/>
-                <a:cs typeface="Times New Roman" panose="02020603050405020304" pitchFamily="18" charset="0"/>
-              </a:rPr>
-              <a:t>[1] Mecanismos e Arquitetura de Computação em Nuvem</a:t>
-            </a:r>
-          </a:p>
-          <a:p>
-            <a:pPr marL="0" indent="0" algn="just">
-              <a:buNone/>
-            </a:pPr>
-            <a:r>
-              <a:rPr lang="pt-BR" sz="2000" b="1" dirty="0">
-                <a:solidFill>
-                  <a:srgbClr val="FF0000"/>
-                </a:solidFill>
-                <a:latin typeface="Times New Roman" panose="02020603050405020304" pitchFamily="18" charset="0"/>
-                <a:cs typeface="Times New Roman" panose="02020603050405020304" pitchFamily="18" charset="0"/>
-              </a:rPr>
-              <a:t>Disponível em:</a:t>
-            </a:r>
-          </a:p>
-          <a:p>
-            <a:pPr marL="0" indent="0" algn="just">
-              <a:buNone/>
-            </a:pPr>
-            <a:r>
-              <a:rPr lang="pt-BR" sz="2000" b="1" dirty="0">
-                <a:solidFill>
-                  <a:srgbClr val="FF0000"/>
-                </a:solidFill>
-                <a:latin typeface="Times New Roman" panose="02020603050405020304" pitchFamily="18" charset="0"/>
-                <a:cs typeface="Times New Roman" panose="02020603050405020304" pitchFamily="18" charset="0"/>
-              </a:rPr>
-              <a:t> </a:t>
-            </a:r>
-            <a:r>
-              <a:rPr lang="pt-BR" sz="2000" dirty="0">
-                <a:latin typeface="Times New Roman" panose="02020603050405020304" pitchFamily="18" charset="0"/>
-                <a:cs typeface="Times New Roman" panose="02020603050405020304" pitchFamily="18" charset="0"/>
-                <a:hlinkClick r:id="rId3"/>
-              </a:rPr>
-              <a:t>https://www.gta.ufrj.br/ensino/eel879/trabalhos_vf_2009_2/seabra/componentes.html</a:t>
-            </a:r>
             <a:endParaRPr lang="pt-BR" sz="2000" dirty="0">
-              <a:latin typeface="Times New Roman" panose="02020603050405020304" pitchFamily="18" charset="0"/>
-              <a:cs typeface="Times New Roman" panose="02020603050405020304" pitchFamily="18" charset="0"/>
-            </a:endParaRPr>
-          </a:p>
-          <a:p>
-            <a:pPr marL="0" indent="0" algn="just">
-              <a:buNone/>
-            </a:pPr>
-            <a:endParaRPr lang="pt-BR" sz="2000" dirty="0">
-              <a:latin typeface="Times New Roman" panose="02020603050405020304" pitchFamily="18" charset="0"/>
-              <a:cs typeface="Times New Roman" panose="02020603050405020304" pitchFamily="18" charset="0"/>
-            </a:endParaRPr>
-          </a:p>
-          <a:p>
-            <a:pPr marL="0" indent="0" algn="just">
-              <a:buNone/>
-            </a:pPr>
-            <a:r>
-              <a:rPr lang="pt-BR" sz="2000" dirty="0">
-                <a:latin typeface="Times New Roman" panose="02020603050405020304" pitchFamily="18" charset="0"/>
-                <a:cs typeface="Times New Roman" panose="02020603050405020304" pitchFamily="18" charset="0"/>
-              </a:rPr>
-              <a:t>[2] AWS - Arquitetura de Computação em Nuvem. </a:t>
-            </a:r>
-          </a:p>
-          <a:p>
-            <a:pPr marL="0" indent="0" algn="just">
-              <a:buNone/>
-            </a:pPr>
-            <a:r>
-              <a:rPr lang="pt-BR" sz="2000" b="1" dirty="0">
-                <a:solidFill>
-                  <a:srgbClr val="FF0000"/>
-                </a:solidFill>
-                <a:latin typeface="Times New Roman" panose="02020603050405020304" pitchFamily="18" charset="0"/>
-                <a:cs typeface="Times New Roman" panose="02020603050405020304" pitchFamily="18" charset="0"/>
-              </a:rPr>
-              <a:t>Disponível em: </a:t>
-            </a:r>
-            <a:r>
-              <a:rPr lang="pt-BR" sz="2000" dirty="0">
-                <a:latin typeface="Times New Roman" panose="02020603050405020304" pitchFamily="18" charset="0"/>
-                <a:cs typeface="Times New Roman" panose="02020603050405020304" pitchFamily="18" charset="0"/>
-                <a:hlinkClick r:id="rId4"/>
-              </a:rPr>
-              <a:t>https://aws.amazon.com/pt/training/awsacademy/cloud-computing-architecture/</a:t>
-            </a:r>
-            <a:endParaRPr lang="pt-BR" sz="2000" dirty="0">
-              <a:latin typeface="Times New Roman" panose="02020603050405020304" pitchFamily="18" charset="0"/>
-              <a:cs typeface="Times New Roman" panose="02020603050405020304" pitchFamily="18" charset="0"/>
-            </a:endParaRPr>
-          </a:p>
-          <a:p>
-            <a:pPr marL="0" indent="0" algn="just">
-              <a:buNone/>
-            </a:pPr>
-            <a:endParaRPr lang="pt-BR" sz="2000" dirty="0">
-              <a:latin typeface="Times New Roman" panose="02020603050405020304" pitchFamily="18" charset="0"/>
-              <a:cs typeface="Times New Roman" panose="02020603050405020304" pitchFamily="18" charset="0"/>
-            </a:endParaRPr>
-          </a:p>
-          <a:p>
-            <a:pPr marL="0" indent="0" algn="just">
-              <a:buNone/>
-            </a:pPr>
-            <a:endParaRPr lang="pt-BR" sz="2000" dirty="0">
-              <a:latin typeface="Calibri" panose="020F0502020204030204" pitchFamily="34" charset="0"/>
+              <a:solidFill>
+                <a:schemeClr val="tx1"/>
+              </a:solidFill>
+              <a:latin typeface="Times" panose="02020603050405020304" pitchFamily="18" charset="0"/>
+              <a:cs typeface="Times" panose="02020603050405020304" pitchFamily="18" charset="0"/>
             </a:endParaRPr>
           </a:p>
         </p:txBody>
       </p:sp>
+      <p:pic>
+        <p:nvPicPr>
+          <p:cNvPr id="5" name="Imagem 4">
+            <a:extLst>
+              <a:ext uri="{FF2B5EF4-FFF2-40B4-BE49-F238E27FC236}">
+                <a16:creationId xmlns:a16="http://schemas.microsoft.com/office/drawing/2014/main" id="{FA739BE1-5CB5-8171-D84C-38E13099BC03}"/>
+              </a:ext>
+            </a:extLst>
+          </p:cNvPr>
+          <p:cNvPicPr>
+            <a:picLocks noChangeAspect="1"/>
+          </p:cNvPicPr>
+          <p:nvPr/>
+        </p:nvPicPr>
+        <p:blipFill>
+          <a:blip r:embed="rId3"/>
+          <a:stretch>
+            <a:fillRect/>
+          </a:stretch>
+        </p:blipFill>
+        <p:spPr>
+          <a:xfrm>
+            <a:off x="1958687" y="921562"/>
+            <a:ext cx="4591318" cy="4161195"/>
+          </a:xfrm>
+          <a:prstGeom prst="rect">
+            <a:avLst/>
+          </a:prstGeom>
+        </p:spPr>
+      </p:pic>
     </p:spTree>
     <p:extLst>
       <p:ext uri="{BB962C8B-B14F-4D97-AF65-F5344CB8AC3E}">
-        <p14:creationId xmlns:p14="http://schemas.microsoft.com/office/powerpoint/2010/main" val="4175167667"/>
+        <p14:creationId xmlns:p14="http://schemas.microsoft.com/office/powerpoint/2010/main" val="1102997639"/>
       </p:ext>
     </p:extLst>
   </p:cSld>
@@ -4724,20 +5419,12 @@
           <a:lstStyle/>
           <a:p>
             <a:r>
-              <a:rPr lang="en-US" b="1" dirty="0" err="1">
+              <a:rPr lang="en-US" b="1" dirty="0">
                 <a:solidFill>
                   <a:srgbClr val="0070C0"/>
                 </a:solidFill>
               </a:rPr>
-              <a:t>Aprenda</a:t>
-            </a:r>
-            <a:r>
-              <a:rPr lang="en-US" b="1" dirty="0">
-                <a:solidFill>
-                  <a:srgbClr val="0070C0"/>
-                </a:solidFill>
-              </a:rPr>
-              <a:t>+</a:t>
+              <a:t>Registro.br</a:t>
             </a:r>
           </a:p>
         </p:txBody>
@@ -4755,7 +5442,7 @@
         <p:spPr>
           <a:xfrm>
             <a:off x="142865" y="1200150"/>
-            <a:ext cx="8865056" cy="3737370"/>
+            <a:ext cx="8865056" cy="3847338"/>
           </a:xfrm>
         </p:spPr>
         <p:txBody>
@@ -4768,11 +5455,34 @@
               <a:buNone/>
             </a:pPr>
             <a:r>
-              <a:rPr lang="pt-BR" sz="2400" dirty="0">
-                <a:latin typeface="Times New Roman" panose="02020603050405020304" pitchFamily="18" charset="0"/>
-                <a:cs typeface="Times New Roman" panose="02020603050405020304" pitchFamily="18" charset="0"/>
-              </a:rPr>
-              <a:t>[1] Mecanismos e Arquitetura de Computação em Nuvem.</a:t>
+              <a:rPr lang="pt-BR" sz="2000" dirty="0">
+                <a:solidFill>
+                  <a:schemeClr val="tx1"/>
+                </a:solidFill>
+                <a:latin typeface="Times" panose="02020603050405020304" pitchFamily="18" charset="0"/>
+                <a:cs typeface="Times" panose="02020603050405020304" pitchFamily="18" charset="0"/>
+              </a:rPr>
+              <a:t>O </a:t>
+            </a:r>
+            <a:r>
+              <a:rPr lang="pt-BR" sz="2000" b="1" dirty="0">
+                <a:solidFill>
+                  <a:schemeClr val="tx1"/>
+                </a:solidFill>
+                <a:latin typeface="Times" panose="02020603050405020304" pitchFamily="18" charset="0"/>
+                <a:cs typeface="Times" panose="02020603050405020304" pitchFamily="18" charset="0"/>
+              </a:rPr>
+              <a:t>Registro.br</a:t>
+            </a:r>
+            <a:r>
+              <a:rPr lang="pt-BR" sz="2000" dirty="0">
+                <a:solidFill>
+                  <a:schemeClr val="tx1"/>
+                </a:solidFill>
+                <a:latin typeface="Times" panose="02020603050405020304" pitchFamily="18" charset="0"/>
+                <a:cs typeface="Times" panose="02020603050405020304" pitchFamily="18" charset="0"/>
+              </a:rPr>
+              <a:t> é o departamento do NIC.br responsável pelas atividades de registro e manutenção dos nomes de domínios “.br.” </a:t>
             </a:r>
           </a:p>
           <a:p>
@@ -4780,50 +5490,59 @@
               <a:buNone/>
             </a:pPr>
             <a:r>
-              <a:rPr lang="pt-BR" sz="2400" b="1" dirty="0">
-                <a:solidFill>
-                  <a:srgbClr val="FF0000"/>
-                </a:solidFill>
-                <a:latin typeface="Times New Roman" panose="02020603050405020304" pitchFamily="18" charset="0"/>
-                <a:cs typeface="Times New Roman" panose="02020603050405020304" pitchFamily="18" charset="0"/>
-              </a:rPr>
-              <a:t>Disponível em: </a:t>
-            </a:r>
-            <a:r>
-              <a:rPr lang="pt-BR" sz="2400" dirty="0">
-                <a:latin typeface="Times New Roman" panose="02020603050405020304" pitchFamily="18" charset="0"/>
-                <a:cs typeface="Times New Roman" panose="02020603050405020304" pitchFamily="18" charset="0"/>
+              <a:rPr lang="pt-BR" sz="2000" dirty="0">
+                <a:solidFill>
+                  <a:schemeClr val="tx1"/>
+                </a:solidFill>
+                <a:latin typeface="Times" panose="02020603050405020304" pitchFamily="18" charset="0"/>
+                <a:cs typeface="Times" panose="02020603050405020304" pitchFamily="18" charset="0"/>
+              </a:rPr>
+              <a:t>		</a:t>
+            </a:r>
+            <a:r>
+              <a:rPr lang="pt-BR" sz="2000" dirty="0">
+                <a:solidFill>
+                  <a:schemeClr val="tx1"/>
+                </a:solidFill>
+                <a:latin typeface="Times" panose="02020603050405020304" pitchFamily="18" charset="0"/>
+                <a:cs typeface="Times" panose="02020603050405020304" pitchFamily="18" charset="0"/>
                 <a:hlinkClick r:id="rId3"/>
               </a:rPr>
-              <a:t>https://youtu.be/RWgW-CgdIk0</a:t>
-            </a:r>
-            <a:endParaRPr lang="pt-BR" sz="2400" dirty="0">
-              <a:latin typeface="Times New Roman" panose="02020603050405020304" pitchFamily="18" charset="0"/>
-              <a:cs typeface="Times New Roman" panose="02020603050405020304" pitchFamily="18" charset="0"/>
+              <a:t>https://www.nic.br/pagina/nicbr-atividades-registro-br/159/</a:t>
+            </a:r>
+            <a:endParaRPr lang="pt-BR" sz="2000" dirty="0">
+              <a:solidFill>
+                <a:schemeClr val="tx1"/>
+              </a:solidFill>
+              <a:latin typeface="Times" panose="02020603050405020304" pitchFamily="18" charset="0"/>
+              <a:cs typeface="Times" panose="02020603050405020304" pitchFamily="18" charset="0"/>
             </a:endParaRPr>
           </a:p>
           <a:p>
             <a:pPr marL="0" indent="0" algn="just">
               <a:buNone/>
             </a:pPr>
-            <a:r>
-              <a:rPr lang="pt-BR" sz="2400" dirty="0">
-                <a:latin typeface="Times New Roman" panose="02020603050405020304" pitchFamily="18" charset="0"/>
-                <a:cs typeface="Times New Roman" panose="02020603050405020304" pitchFamily="18" charset="0"/>
-              </a:rPr>
-              <a:t>		  </a:t>
-            </a:r>
+            <a:endParaRPr lang="pt-BR" sz="2000" dirty="0">
+              <a:solidFill>
+                <a:schemeClr val="tx1"/>
+              </a:solidFill>
+              <a:latin typeface="Times" panose="02020603050405020304" pitchFamily="18" charset="0"/>
+              <a:cs typeface="Times" panose="02020603050405020304" pitchFamily="18" charset="0"/>
+            </a:endParaRPr>
           </a:p>
           <a:p>
             <a:pPr marL="0" indent="0" algn="just">
               <a:buNone/>
             </a:pPr>
             <a:r>
-              <a:rPr lang="pt-BR" sz="2400" dirty="0">
-                <a:latin typeface="Times New Roman" panose="02020603050405020304" pitchFamily="18" charset="0"/>
-                <a:cs typeface="Times New Roman" panose="02020603050405020304" pitchFamily="18" charset="0"/>
-              </a:rPr>
-              <a:t>[2] AWS - Arquitetura de Computação em Nuvem. </a:t>
+              <a:rPr lang="pt-BR" sz="2000" dirty="0">
+                <a:solidFill>
+                  <a:schemeClr val="tx1"/>
+                </a:solidFill>
+                <a:latin typeface="Times" panose="02020603050405020304" pitchFamily="18" charset="0"/>
+                <a:cs typeface="Times" panose="02020603050405020304" pitchFamily="18" charset="0"/>
+              </a:rPr>
+              <a:t>Também executa serviço de distribuição de endereços IPv4 e IPv6 e de números de Sistemas Autônomos (ASN) no país.</a:t>
             </a:r>
           </a:p>
           <a:p>
@@ -4831,35 +5550,122 @@
               <a:buNone/>
             </a:pPr>
             <a:r>
-              <a:rPr lang="pt-BR" sz="2400" b="1" dirty="0">
-                <a:solidFill>
-                  <a:srgbClr val="FF0000"/>
-                </a:solidFill>
-                <a:latin typeface="Times New Roman" panose="02020603050405020304" pitchFamily="18" charset="0"/>
-                <a:cs typeface="Times New Roman" panose="02020603050405020304" pitchFamily="18" charset="0"/>
-              </a:rPr>
-              <a:t>Disponível em: </a:t>
-            </a:r>
-            <a:r>
-              <a:rPr lang="pt-BR" sz="2400" dirty="0">
-                <a:latin typeface="Times New Roman" panose="02020603050405020304" pitchFamily="18" charset="0"/>
-                <a:cs typeface="Times New Roman" panose="02020603050405020304" pitchFamily="18" charset="0"/>
+              <a:rPr lang="pt-BR" sz="2000" dirty="0">
+                <a:solidFill>
+                  <a:schemeClr val="tx1"/>
+                </a:solidFill>
+                <a:latin typeface="Times" panose="02020603050405020304" pitchFamily="18" charset="0"/>
+                <a:cs typeface="Times" panose="02020603050405020304" pitchFamily="18" charset="0"/>
+              </a:rPr>
+              <a:t>		</a:t>
+            </a:r>
+            <a:r>
+              <a:rPr lang="pt-BR" sz="2000" dirty="0">
+                <a:solidFill>
+                  <a:schemeClr val="tx1"/>
+                </a:solidFill>
+                <a:latin typeface="Times" panose="02020603050405020304" pitchFamily="18" charset="0"/>
+                <a:cs typeface="Times" panose="02020603050405020304" pitchFamily="18" charset="0"/>
                 <a:hlinkClick r:id="rId4"/>
               </a:rPr>
-              <a:t>https://www.youtube.com/watch?v=Z3SYDTMP3ME</a:t>
-            </a:r>
-            <a:endParaRPr lang="pt-BR" sz="2400" dirty="0">
-              <a:latin typeface="Times New Roman" panose="02020603050405020304" pitchFamily="18" charset="0"/>
-              <a:cs typeface="Times New Roman" panose="02020603050405020304" pitchFamily="18" charset="0"/>
+              <a:t>https://registro.br/</a:t>
+            </a:r>
+            <a:endParaRPr lang="pt-BR" sz="2000" dirty="0">
+              <a:solidFill>
+                <a:schemeClr val="tx1"/>
+              </a:solidFill>
+              <a:latin typeface="Times" panose="02020603050405020304" pitchFamily="18" charset="0"/>
+              <a:cs typeface="Times" panose="02020603050405020304" pitchFamily="18" charset="0"/>
             </a:endParaRPr>
           </a:p>
           <a:p>
             <a:pPr marL="0" indent="0" algn="just">
               <a:buNone/>
             </a:pPr>
-            <a:endParaRPr lang="pt-BR" sz="2400" dirty="0">
-              <a:latin typeface="Times New Roman" panose="02020603050405020304" pitchFamily="18" charset="0"/>
-              <a:cs typeface="Times New Roman" panose="02020603050405020304" pitchFamily="18" charset="0"/>
+            <a:endParaRPr lang="pt-BR" sz="2000" dirty="0">
+              <a:solidFill>
+                <a:schemeClr val="tx1"/>
+              </a:solidFill>
+              <a:latin typeface="Times" panose="02020603050405020304" pitchFamily="18" charset="0"/>
+              <a:cs typeface="Times" panose="02020603050405020304" pitchFamily="18" charset="0"/>
+            </a:endParaRPr>
+          </a:p>
+          <a:p>
+            <a:pPr marL="0" indent="0" algn="just">
+              <a:buNone/>
+            </a:pPr>
+            <a:r>
+              <a:rPr lang="pt-BR" sz="2000" b="1" dirty="0" err="1">
+                <a:solidFill>
+                  <a:srgbClr val="FF0000"/>
+                </a:solidFill>
+                <a:latin typeface="Times" panose="02020603050405020304" pitchFamily="18" charset="0"/>
+                <a:cs typeface="Times" panose="02020603050405020304" pitchFamily="18" charset="0"/>
+              </a:rPr>
+              <a:t>Whois</a:t>
+            </a:r>
+            <a:r>
+              <a:rPr lang="pt-BR" sz="2000" b="1" dirty="0">
+                <a:solidFill>
+                  <a:srgbClr val="FF0000"/>
+                </a:solidFill>
+                <a:latin typeface="Times" panose="02020603050405020304" pitchFamily="18" charset="0"/>
+                <a:cs typeface="Times" panose="02020603050405020304" pitchFamily="18" charset="0"/>
+              </a:rPr>
+              <a:t> (</a:t>
+            </a:r>
+            <a:r>
+              <a:rPr lang="pt-BR" sz="2000" b="1" dirty="0">
+                <a:solidFill>
+                  <a:schemeClr val="tx1"/>
+                </a:solidFill>
+                <a:latin typeface="Times" panose="02020603050405020304" pitchFamily="18" charset="0"/>
+                <a:cs typeface="Times" panose="02020603050405020304" pitchFamily="18" charset="0"/>
+              </a:rPr>
+              <a:t>Informações do dono do domínio</a:t>
+            </a:r>
+            <a:r>
+              <a:rPr lang="pt-BR" sz="2000" b="1" dirty="0">
+                <a:solidFill>
+                  <a:srgbClr val="FF0000"/>
+                </a:solidFill>
+                <a:latin typeface="Times" panose="02020603050405020304" pitchFamily="18" charset="0"/>
+                <a:cs typeface="Times" panose="02020603050405020304" pitchFamily="18" charset="0"/>
+              </a:rPr>
+              <a:t>)</a:t>
+            </a:r>
+          </a:p>
+          <a:p>
+            <a:pPr marL="0" indent="0" algn="just">
+              <a:buNone/>
+            </a:pPr>
+            <a:r>
+              <a:rPr lang="pt-BR" sz="2000" dirty="0">
+                <a:solidFill>
+                  <a:schemeClr val="tx1"/>
+                </a:solidFill>
+                <a:latin typeface="Times" panose="02020603050405020304" pitchFamily="18" charset="0"/>
+                <a:cs typeface="Times" panose="02020603050405020304" pitchFamily="18" charset="0"/>
+              </a:rPr>
+              <a:t>		</a:t>
+            </a:r>
+            <a:r>
+              <a:rPr lang="pt-BR" sz="2000" dirty="0">
+                <a:solidFill>
+                  <a:schemeClr val="tx1"/>
+                </a:solidFill>
+                <a:latin typeface="Times" panose="02020603050405020304" pitchFamily="18" charset="0"/>
+                <a:cs typeface="Times" panose="02020603050405020304" pitchFamily="18" charset="0"/>
+                <a:hlinkClick r:id="rId5"/>
+              </a:rPr>
+              <a:t>https://registro.br/tecnologia/ferramentas/whois/</a:t>
+            </a:r>
+            <a:endParaRPr lang="pt-BR" sz="2000" dirty="0">
+              <a:solidFill>
+                <a:srgbClr val="FF0000"/>
+              </a:solidFill>
+              <a:latin typeface="Times" panose="02020603050405020304" pitchFamily="18" charset="0"/>
+              <a:cs typeface="Times" panose="02020603050405020304" pitchFamily="18" charset="0"/>
             </a:endParaRPr>
           </a:p>
         </p:txBody>
@@ -4867,7 +5673,7 @@
     </p:spTree>
     <p:extLst>
       <p:ext uri="{BB962C8B-B14F-4D97-AF65-F5344CB8AC3E}">
-        <p14:creationId xmlns:p14="http://schemas.microsoft.com/office/powerpoint/2010/main" val="2747596967"/>
+        <p14:creationId xmlns:p14="http://schemas.microsoft.com/office/powerpoint/2010/main" val="541049331"/>
       </p:ext>
     </p:extLst>
   </p:cSld>
@@ -4923,7 +5729,7 @@
                   <a:srgbClr val="0070C0"/>
                 </a:solidFill>
               </a:rPr>
-              <a:t>Dinâmica</a:t>
+              <a:t>Leitura</a:t>
             </a:r>
             <a:r>
               <a:rPr lang="en-US" b="1" dirty="0">
@@ -4931,7 +5737,7 @@
                   <a:srgbClr val="0070C0"/>
                 </a:solidFill>
               </a:rPr>
-              <a:t>/</a:t>
+              <a:t> </a:t>
             </a:r>
             <a:r>
               <a:rPr lang="en-US" b="1" dirty="0" err="1">
@@ -4939,7 +5745,7 @@
                   <a:srgbClr val="0070C0"/>
                 </a:solidFill>
               </a:rPr>
-              <a:t>Atividades</a:t>
+              <a:t>Específica</a:t>
             </a:r>
             <a:endParaRPr lang="en-US" b="1" dirty="0">
               <a:solidFill>
@@ -4961,8 +5767,8 @@
         </p:nvSpPr>
         <p:spPr>
           <a:xfrm>
-            <a:off x="139472" y="1063230"/>
-            <a:ext cx="8865056" cy="3606305"/>
+            <a:off x="142865" y="1200151"/>
+            <a:ext cx="8865056" cy="3394472"/>
           </a:xfrm>
         </p:spPr>
         <p:txBody>
@@ -4979,8 +5785,48 @@
                 <a:latin typeface="Times New Roman" panose="02020603050405020304" pitchFamily="18" charset="0"/>
                 <a:cs typeface="Times New Roman" panose="02020603050405020304" pitchFamily="18" charset="0"/>
               </a:rPr>
-              <a:t>Exercícios (Atividade Verificadora de Aprendizagem)</a:t>
-            </a:r>
+              <a:t>[1] </a:t>
+            </a:r>
+            <a:r>
+              <a:rPr lang="pt-BR" sz="2000" b="1" dirty="0">
+                <a:latin typeface="Times New Roman" panose="02020603050405020304" pitchFamily="18" charset="0"/>
+                <a:cs typeface="Times New Roman" panose="02020603050405020304" pitchFamily="18" charset="0"/>
+              </a:rPr>
+              <a:t>O que é Microsoft Azure? Veja como funciona e preços do serviço de nuvem</a:t>
+            </a:r>
+          </a:p>
+          <a:p>
+            <a:pPr marL="0" indent="0" algn="just">
+              <a:buNone/>
+            </a:pPr>
+            <a:r>
+              <a:rPr lang="pt-BR" sz="2000" b="1" dirty="0">
+                <a:solidFill>
+                  <a:srgbClr val="FF0000"/>
+                </a:solidFill>
+                <a:latin typeface="Times New Roman" panose="02020603050405020304" pitchFamily="18" charset="0"/>
+                <a:cs typeface="Times New Roman" panose="02020603050405020304" pitchFamily="18" charset="0"/>
+              </a:rPr>
+              <a:t>Disponível em: </a:t>
+            </a:r>
+            <a:r>
+              <a:rPr lang="pt-BR" sz="2000" b="1" dirty="0">
+                <a:solidFill>
+                  <a:srgbClr val="FF0000"/>
+                </a:solidFill>
+                <a:latin typeface="Times New Roman" panose="02020603050405020304" pitchFamily="18" charset="0"/>
+                <a:cs typeface="Times New Roman" panose="02020603050405020304" pitchFamily="18" charset="0"/>
+                <a:hlinkClick r:id="rId3"/>
+              </a:rPr>
+              <a:t>https://www.techtudo.com.br/listas/2020/07/o-que-e-microsoft-azure-veja-como-funciona-e-precos-do-servico-de-nuvem.ghtml</a:t>
+            </a:r>
+            <a:endParaRPr lang="pt-BR" sz="2000" b="1" dirty="0">
+              <a:solidFill>
+                <a:srgbClr val="FF0000"/>
+              </a:solidFill>
+              <a:latin typeface="Times New Roman" panose="02020603050405020304" pitchFamily="18" charset="0"/>
+              <a:cs typeface="Times New Roman" panose="02020603050405020304" pitchFamily="18" charset="0"/>
+            </a:endParaRPr>
           </a:p>
           <a:p>
             <a:pPr marL="0" indent="0" algn="just">
@@ -4995,20 +5841,110 @@
             <a:pPr marL="0" indent="0" algn="just">
               <a:buNone/>
             </a:pPr>
+            <a:endParaRPr lang="pt-BR" sz="2000" dirty="0">
+              <a:latin typeface="Times New Roman" panose="02020603050405020304" pitchFamily="18" charset="0"/>
+              <a:cs typeface="Times New Roman" panose="02020603050405020304" pitchFamily="18" charset="0"/>
+            </a:endParaRPr>
+          </a:p>
+          <a:p>
+            <a:pPr marL="0" indent="0" algn="just">
+              <a:buNone/>
+            </a:pPr>
             <a:r>
               <a:rPr lang="pt-BR" sz="2000" dirty="0">
                 <a:latin typeface="Times New Roman" panose="02020603050405020304" pitchFamily="18" charset="0"/>
                 <a:cs typeface="Times New Roman" panose="02020603050405020304" pitchFamily="18" charset="0"/>
               </a:rPr>
-              <a:t>- </a:t>
+              <a:t>[2] </a:t>
             </a:r>
             <a:r>
               <a:rPr lang="pt-BR" sz="2000" b="1" dirty="0">
                 <a:latin typeface="Times New Roman" panose="02020603050405020304" pitchFamily="18" charset="0"/>
                 <a:cs typeface="Times New Roman" panose="02020603050405020304" pitchFamily="18" charset="0"/>
               </a:rPr>
-              <a:t>Quiz</a:t>
-            </a:r>
+              <a:t>Microsoft AZURE</a:t>
+            </a:r>
+            <a:r>
+              <a:rPr lang="pt-BR" sz="2000" dirty="0">
+                <a:latin typeface="Times New Roman" panose="02020603050405020304" pitchFamily="18" charset="0"/>
+                <a:cs typeface="Times New Roman" panose="02020603050405020304" pitchFamily="18" charset="0"/>
+              </a:rPr>
+              <a:t> </a:t>
+            </a:r>
+          </a:p>
+          <a:p>
+            <a:pPr marL="0" indent="0" algn="just">
+              <a:buNone/>
+            </a:pPr>
+            <a:r>
+              <a:rPr lang="pt-BR" sz="2000" b="1" dirty="0">
+                <a:solidFill>
+                  <a:srgbClr val="FF0000"/>
+                </a:solidFill>
+                <a:latin typeface="Times New Roman" panose="02020603050405020304" pitchFamily="18" charset="0"/>
+                <a:cs typeface="Times New Roman" panose="02020603050405020304" pitchFamily="18" charset="0"/>
+              </a:rPr>
+              <a:t>Disponível em: </a:t>
+            </a:r>
+            <a:r>
+              <a:rPr lang="pt-BR" sz="2000" b="1" dirty="0">
+                <a:solidFill>
+                  <a:srgbClr val="FF0000"/>
+                </a:solidFill>
+                <a:latin typeface="Times New Roman" panose="02020603050405020304" pitchFamily="18" charset="0"/>
+                <a:cs typeface="Times New Roman" panose="02020603050405020304" pitchFamily="18" charset="0"/>
+                <a:hlinkClick r:id="rId4"/>
+              </a:rPr>
+              <a:t>https://cloud.techdata.dk/media/microsoft/salgskort/migrate-workloads-to-azure/ms-playcard-migrate-workloads-to-azure.pdf</a:t>
+            </a:r>
+            <a:endParaRPr lang="pt-BR" sz="2000" b="1" dirty="0">
+              <a:solidFill>
+                <a:srgbClr val="FF0000"/>
+              </a:solidFill>
+              <a:latin typeface="Times New Roman" panose="02020603050405020304" pitchFamily="18" charset="0"/>
+              <a:cs typeface="Times New Roman" panose="02020603050405020304" pitchFamily="18" charset="0"/>
+            </a:endParaRPr>
+          </a:p>
+          <a:p>
+            <a:pPr marL="0" indent="0" algn="just">
+              <a:buNone/>
+            </a:pPr>
+            <a:endParaRPr lang="pt-BR" sz="2000" dirty="0">
+              <a:latin typeface="Times New Roman" panose="02020603050405020304" pitchFamily="18" charset="0"/>
+              <a:cs typeface="Times New Roman" panose="02020603050405020304" pitchFamily="18" charset="0"/>
+            </a:endParaRPr>
+          </a:p>
+          <a:p>
+            <a:pPr marL="0" indent="0" algn="just">
+              <a:buNone/>
+            </a:pPr>
+            <a:endParaRPr lang="pt-BR" sz="2000" dirty="0">
+              <a:latin typeface="Times New Roman" panose="02020603050405020304" pitchFamily="18" charset="0"/>
+              <a:cs typeface="Times New Roman" panose="02020603050405020304" pitchFamily="18" charset="0"/>
+            </a:endParaRPr>
+          </a:p>
+          <a:p>
+            <a:pPr marL="0" indent="0" algn="just">
+              <a:buNone/>
+            </a:pPr>
+            <a:endParaRPr lang="pt-BR" sz="2000" dirty="0">
+              <a:latin typeface="Times New Roman" panose="02020603050405020304" pitchFamily="18" charset="0"/>
+              <a:cs typeface="Times New Roman" panose="02020603050405020304" pitchFamily="18" charset="0"/>
+            </a:endParaRPr>
+          </a:p>
+          <a:p>
+            <a:pPr marL="0" indent="0" algn="just">
+              <a:buNone/>
+            </a:pPr>
+            <a:endParaRPr lang="pt-BR" sz="2000" dirty="0">
+              <a:latin typeface="Times New Roman" panose="02020603050405020304" pitchFamily="18" charset="0"/>
+              <a:cs typeface="Times New Roman" panose="02020603050405020304" pitchFamily="18" charset="0"/>
+            </a:endParaRPr>
+          </a:p>
+          <a:p>
+            <a:pPr marL="0" indent="0" algn="just">
+              <a:buNone/>
+            </a:pPr>
             <a:endParaRPr lang="pt-BR" sz="2000" dirty="0">
               <a:latin typeface="Calibri" panose="020F0502020204030204" pitchFamily="34" charset="0"/>
             </a:endParaRPr>
@@ -5018,7 +5954,7 @@
     </p:spTree>
     <p:extLst>
       <p:ext uri="{BB962C8B-B14F-4D97-AF65-F5344CB8AC3E}">
-        <p14:creationId xmlns:p14="http://schemas.microsoft.com/office/powerpoint/2010/main" val="2470652989"/>
+        <p14:creationId xmlns:p14="http://schemas.microsoft.com/office/powerpoint/2010/main" val="4175167667"/>
       </p:ext>
     </p:extLst>
   </p:cSld>
@@ -5074,7 +6010,7 @@
                   <a:srgbClr val="0070C0"/>
                 </a:solidFill>
               </a:rPr>
-              <a:t>Referências</a:t>
+              <a:t>Aprenda</a:t>
             </a:r>
             <a:r>
               <a:rPr lang="en-US" b="1" dirty="0">
@@ -5082,21 +6018,8 @@
                   <a:srgbClr val="0070C0"/>
                 </a:solidFill>
               </a:rPr>
-              <a:t> </a:t>
-            </a:r>
-            <a:r>
-              <a:rPr lang="en-US" b="1" dirty="0" err="1">
-                <a:solidFill>
-                  <a:srgbClr val="0070C0"/>
-                </a:solidFill>
-              </a:rPr>
-              <a:t>Bibliográficas</a:t>
-            </a:r>
-            <a:endParaRPr lang="en-US" b="1" dirty="0">
-              <a:solidFill>
-                <a:srgbClr val="0070C0"/>
-              </a:solidFill>
-            </a:endParaRPr>
+              <a:t>+</a:t>
+            </a:r>
           </a:p>
         </p:txBody>
       </p:sp>
@@ -5112,8 +6035,8 @@
         </p:nvSpPr>
         <p:spPr>
           <a:xfrm>
-            <a:off x="142865" y="1200151"/>
-            <a:ext cx="8865056" cy="3394472"/>
+            <a:off x="142865" y="1200150"/>
+            <a:ext cx="8865056" cy="3737370"/>
           </a:xfrm>
         </p:spPr>
         <p:txBody>
@@ -5126,64 +6049,43 @@
               <a:buNone/>
             </a:pPr>
             <a:r>
-              <a:rPr lang="pt-BR" sz="2000" dirty="0">
-                <a:solidFill>
-                  <a:schemeClr val="tx1"/>
-                </a:solidFill>
+              <a:rPr lang="pt-BR" sz="2400" dirty="0">
                 <a:latin typeface="Times New Roman" panose="02020603050405020304" pitchFamily="18" charset="0"/>
                 <a:cs typeface="Times New Roman" panose="02020603050405020304" pitchFamily="18" charset="0"/>
               </a:rPr>
               <a:t>[1] </a:t>
             </a:r>
             <a:r>
-              <a:rPr lang="pt-BR" sz="2000" b="1" dirty="0">
-                <a:solidFill>
-                  <a:srgbClr val="FF0000"/>
-                </a:solidFill>
+              <a:rPr lang="pt-BR" sz="2400" b="1" dirty="0">
                 <a:latin typeface="Times New Roman" panose="02020603050405020304" pitchFamily="18" charset="0"/>
                 <a:cs typeface="Times New Roman" panose="02020603050405020304" pitchFamily="18" charset="0"/>
               </a:rPr>
-              <a:t>SOUSA, Flávio RC; MOREIRA, Leonardo O.; MACHADO,</a:t>
-            </a:r>
-            <a:r>
-              <a:rPr lang="pt-BR" sz="2000" dirty="0">
-                <a:solidFill>
-                  <a:schemeClr val="tx1"/>
-                </a:solidFill>
-                <a:latin typeface="Times New Roman" panose="02020603050405020304" pitchFamily="18" charset="0"/>
-                <a:cs typeface="Times New Roman" panose="02020603050405020304" pitchFamily="18" charset="0"/>
-              </a:rPr>
-              <a:t> </a:t>
-            </a:r>
-            <a:r>
-              <a:rPr lang="pt-BR" sz="2000" dirty="0" err="1">
-                <a:solidFill>
-                  <a:schemeClr val="tx1"/>
-                </a:solidFill>
-                <a:latin typeface="Times New Roman" panose="02020603050405020304" pitchFamily="18" charset="0"/>
-                <a:cs typeface="Times New Roman" panose="02020603050405020304" pitchFamily="18" charset="0"/>
-              </a:rPr>
-              <a:t>Javam</a:t>
-            </a:r>
-            <a:r>
-              <a:rPr lang="pt-BR" sz="2000" dirty="0">
-                <a:solidFill>
-                  <a:schemeClr val="tx1"/>
-                </a:solidFill>
-                <a:latin typeface="Times New Roman" panose="02020603050405020304" pitchFamily="18" charset="0"/>
-                <a:cs typeface="Times New Roman" panose="02020603050405020304" pitchFamily="18" charset="0"/>
-              </a:rPr>
-              <a:t> C. Computação em nuvem: Conceitos, tecnologias, aplicações e desafios. II Escola Regional de Computação Ceará, Maranhão e Piauí (ERCEMAPI), p. 150-175, 2009.</a:t>
+              <a:t>Como funciona o Microsoft Azure?</a:t>
             </a:r>
           </a:p>
           <a:p>
             <a:pPr marL="0" indent="0" algn="just">
               <a:buNone/>
             </a:pPr>
-            <a:endParaRPr lang="pt-BR" sz="2000" dirty="0">
-              <a:solidFill>
-                <a:schemeClr val="tx1"/>
-              </a:solidFill>
+            <a:r>
+              <a:rPr lang="pt-BR" sz="2400" b="1" dirty="0">
+                <a:solidFill>
+                  <a:srgbClr val="FF0000"/>
+                </a:solidFill>
+                <a:latin typeface="Times New Roman" panose="02020603050405020304" pitchFamily="18" charset="0"/>
+                <a:cs typeface="Times New Roman" panose="02020603050405020304" pitchFamily="18" charset="0"/>
+              </a:rPr>
+              <a:t>Disponível em: </a:t>
+            </a:r>
+            <a:r>
+              <a:rPr lang="pt-BR" sz="2400" dirty="0">
+                <a:latin typeface="Times New Roman" panose="02020603050405020304" pitchFamily="18" charset="0"/>
+                <a:cs typeface="Times New Roman" panose="02020603050405020304" pitchFamily="18" charset="0"/>
+                <a:hlinkClick r:id="rId3"/>
+              </a:rPr>
+              <a:t>https://learn.microsoft.com/pt-br/azure/cloud-adoption-framework/get-started/what-is-azure</a:t>
+            </a:r>
+            <a:endParaRPr lang="pt-BR" sz="2400" dirty="0">
               <a:latin typeface="Times New Roman" panose="02020603050405020304" pitchFamily="18" charset="0"/>
               <a:cs typeface="Times New Roman" panose="02020603050405020304" pitchFamily="18" charset="0"/>
             </a:endParaRPr>
@@ -5191,92 +6093,8 @@
           <a:p>
             <a:pPr marL="0" indent="0" algn="just">
               <a:buNone/>
-              <a:tabLst>
-                <a:tab pos="457200" algn="l"/>
-              </a:tabLst>
             </a:pPr>
-            <a:r>
-              <a:rPr lang="pt-BR" sz="2000" dirty="0">
-                <a:solidFill>
-                  <a:schemeClr val="tx1"/>
-                </a:solidFill>
-                <a:latin typeface="Times New Roman" panose="02020603050405020304" pitchFamily="18" charset="0"/>
-                <a:cs typeface="Times New Roman" panose="02020603050405020304" pitchFamily="18" charset="0"/>
-              </a:rPr>
-              <a:t>[2] </a:t>
-            </a:r>
-            <a:r>
-              <a:rPr lang="pt-BR" sz="2000" b="1" dirty="0">
-                <a:solidFill>
-                  <a:srgbClr val="FF0000"/>
-                </a:solidFill>
-                <a:latin typeface="Times New Roman" panose="02020603050405020304" pitchFamily="18" charset="0"/>
-                <a:cs typeface="Times New Roman" panose="02020603050405020304" pitchFamily="18" charset="0"/>
-              </a:rPr>
-              <a:t>TAURION, Cezar.</a:t>
-            </a:r>
-            <a:r>
-              <a:rPr lang="pt-BR" sz="2000" dirty="0">
-                <a:solidFill>
-                  <a:schemeClr val="tx1"/>
-                </a:solidFill>
-                <a:latin typeface="Times New Roman" panose="02020603050405020304" pitchFamily="18" charset="0"/>
-                <a:cs typeface="Times New Roman" panose="02020603050405020304" pitchFamily="18" charset="0"/>
-              </a:rPr>
-              <a:t> Cloud </a:t>
-            </a:r>
-            <a:r>
-              <a:rPr lang="pt-BR" sz="2000" dirty="0" err="1">
-                <a:solidFill>
-                  <a:schemeClr val="tx1"/>
-                </a:solidFill>
-                <a:latin typeface="Times New Roman" panose="02020603050405020304" pitchFamily="18" charset="0"/>
-                <a:cs typeface="Times New Roman" panose="02020603050405020304" pitchFamily="18" charset="0"/>
-              </a:rPr>
-              <a:t>computing</a:t>
-            </a:r>
-            <a:r>
-              <a:rPr lang="pt-BR" sz="2000" dirty="0">
-                <a:solidFill>
-                  <a:schemeClr val="tx1"/>
-                </a:solidFill>
-                <a:latin typeface="Times New Roman" panose="02020603050405020304" pitchFamily="18" charset="0"/>
-                <a:cs typeface="Times New Roman" panose="02020603050405020304" pitchFamily="18" charset="0"/>
-              </a:rPr>
-              <a:t>-computação em nuvem. </a:t>
-            </a:r>
-            <a:r>
-              <a:rPr lang="pt-BR" sz="2000" dirty="0" err="1">
-                <a:solidFill>
-                  <a:schemeClr val="tx1"/>
-                </a:solidFill>
-                <a:latin typeface="Times New Roman" panose="02020603050405020304" pitchFamily="18" charset="0"/>
-                <a:cs typeface="Times New Roman" panose="02020603050405020304" pitchFamily="18" charset="0"/>
-              </a:rPr>
-              <a:t>Brasport</a:t>
-            </a:r>
-            <a:r>
-              <a:rPr lang="pt-BR" sz="2000" dirty="0">
-                <a:solidFill>
-                  <a:schemeClr val="tx1"/>
-                </a:solidFill>
-                <a:latin typeface="Times New Roman" panose="02020603050405020304" pitchFamily="18" charset="0"/>
-                <a:cs typeface="Times New Roman" panose="02020603050405020304" pitchFamily="18" charset="0"/>
-              </a:rPr>
-              <a:t>, 2009.</a:t>
-            </a:r>
-          </a:p>
-          <a:p>
-            <a:pPr marL="0" indent="0" algn="just">
-              <a:buNone/>
-              <a:tabLst>
-                <a:tab pos="457200" algn="l"/>
-              </a:tabLst>
-            </a:pPr>
-            <a:endParaRPr lang="pt-BR" sz="2000" dirty="0">
-              <a:solidFill>
-                <a:schemeClr val="tx1"/>
-              </a:solidFill>
+            <a:endParaRPr lang="pt-BR" sz="2400" dirty="0">
               <a:latin typeface="Times New Roman" panose="02020603050405020304" pitchFamily="18" charset="0"/>
               <a:cs typeface="Times New Roman" panose="02020603050405020304" pitchFamily="18" charset="0"/>
             </a:endParaRPr>
@@ -5284,72 +6102,72 @@
           <a:p>
             <a:pPr marL="0" indent="0" algn="just">
               <a:buNone/>
-              <a:tabLst>
-                <a:tab pos="457200" algn="l"/>
-              </a:tabLst>
             </a:pPr>
-            <a:r>
-              <a:rPr lang="pt-BR" sz="2000" dirty="0">
-                <a:solidFill>
-                  <a:schemeClr val="tx1"/>
-                </a:solidFill>
+            <a:endParaRPr lang="pt-BR" sz="2400" dirty="0">
+              <a:latin typeface="Times New Roman" panose="02020603050405020304" pitchFamily="18" charset="0"/>
+              <a:cs typeface="Times New Roman" panose="02020603050405020304" pitchFamily="18" charset="0"/>
+            </a:endParaRPr>
+          </a:p>
+          <a:p>
+            <a:pPr marL="0" indent="0" algn="just">
+              <a:buNone/>
+            </a:pPr>
+            <a:r>
+              <a:rPr lang="pt-BR" sz="2400" dirty="0">
                 <a:latin typeface="Times New Roman" panose="02020603050405020304" pitchFamily="18" charset="0"/>
                 <a:cs typeface="Times New Roman" panose="02020603050405020304" pitchFamily="18" charset="0"/>
               </a:rPr>
-              <a:t>[3] </a:t>
-            </a:r>
-            <a:r>
-              <a:rPr lang="pt-BR" sz="2000" b="1" dirty="0">
-                <a:solidFill>
-                  <a:srgbClr val="FF0000"/>
-                </a:solidFill>
+              <a:t>[2] </a:t>
+            </a:r>
+            <a:r>
+              <a:rPr lang="pt-BR" sz="2400" b="1" dirty="0">
                 <a:latin typeface="Times New Roman" panose="02020603050405020304" pitchFamily="18" charset="0"/>
                 <a:cs typeface="Times New Roman" panose="02020603050405020304" pitchFamily="18" charset="0"/>
               </a:rPr>
-              <a:t>BATISTA, Bruno Guazzelli.</a:t>
-            </a:r>
-            <a:r>
-              <a:rPr lang="pt-BR" sz="2000" dirty="0">
-                <a:solidFill>
-                  <a:schemeClr val="tx1"/>
+              <a:t>AZ-900 Microsoft Azure Fundamentals</a:t>
+            </a:r>
+          </a:p>
+          <a:p>
+            <a:pPr marL="0" indent="0" algn="just">
+              <a:buNone/>
+            </a:pPr>
+            <a:r>
+              <a:rPr lang="pt-BR" sz="2400" b="1" dirty="0">
+                <a:solidFill>
+                  <a:srgbClr val="FF0000"/>
                 </a:solidFill>
                 <a:latin typeface="Times New Roman" panose="02020603050405020304" pitchFamily="18" charset="0"/>
                 <a:cs typeface="Times New Roman" panose="02020603050405020304" pitchFamily="18" charset="0"/>
               </a:rPr>
-              <a:t> Modelos de negócio para ambientes de computação em nuvem que consideram atributos de </a:t>
-            </a:r>
-            <a:r>
-              <a:rPr lang="pt-BR" sz="2000" dirty="0" err="1">
-                <a:solidFill>
-                  <a:schemeClr val="tx1"/>
-                </a:solidFill>
+              <a:t>Disponível em: </a:t>
+            </a:r>
+            <a:r>
+              <a:rPr lang="pt-BR" sz="2400" dirty="0">
                 <a:latin typeface="Times New Roman" panose="02020603050405020304" pitchFamily="18" charset="0"/>
                 <a:cs typeface="Times New Roman" panose="02020603050405020304" pitchFamily="18" charset="0"/>
-              </a:rPr>
-              <a:t>qos</a:t>
-            </a:r>
-            <a:r>
-              <a:rPr lang="pt-BR" sz="2000" dirty="0">
-                <a:solidFill>
-                  <a:schemeClr val="tx1"/>
-                </a:solidFill>
-                <a:latin typeface="Times New Roman" panose="02020603050405020304" pitchFamily="18" charset="0"/>
-                <a:cs typeface="Times New Roman" panose="02020603050405020304" pitchFamily="18" charset="0"/>
-              </a:rPr>
-              <a:t> relacionados a desempenho e a segurança. 2016. Tese de Doutorado. Universidade de São Paulo.</a:t>
-            </a:r>
+                <a:hlinkClick r:id="rId4"/>
+              </a:rPr>
+              <a:t>https://www.youtube.com/watch?v=4ub1uGKQK6U</a:t>
+            </a:r>
+            <a:endParaRPr lang="pt-BR" sz="2400" dirty="0">
+              <a:latin typeface="Times New Roman" panose="02020603050405020304" pitchFamily="18" charset="0"/>
+              <a:cs typeface="Times New Roman" panose="02020603050405020304" pitchFamily="18" charset="0"/>
+            </a:endParaRPr>
           </a:p>
           <a:p>
             <a:pPr marL="0" indent="0" algn="just">
               <a:buNone/>
-              <a:tabLst>
-                <a:tab pos="457200" algn="l"/>
-              </a:tabLst>
             </a:pPr>
-            <a:endParaRPr lang="pt-BR" sz="2000" dirty="0">
-              <a:solidFill>
-                <a:schemeClr val="tx1"/>
-              </a:solidFill>
+            <a:endParaRPr lang="pt-BR" sz="2400" dirty="0">
+              <a:latin typeface="Times New Roman" panose="02020603050405020304" pitchFamily="18" charset="0"/>
+              <a:cs typeface="Times New Roman" panose="02020603050405020304" pitchFamily="18" charset="0"/>
+            </a:endParaRPr>
+          </a:p>
+          <a:p>
+            <a:pPr marL="0" indent="0" algn="just">
+              <a:buNone/>
+            </a:pPr>
+            <a:endParaRPr lang="pt-BR" sz="2400" dirty="0">
               <a:latin typeface="Times New Roman" panose="02020603050405020304" pitchFamily="18" charset="0"/>
               <a:cs typeface="Times New Roman" panose="02020603050405020304" pitchFamily="18" charset="0"/>
             </a:endParaRPr>
@@ -5359,7 +6177,7 @@
     </p:spTree>
     <p:extLst>
       <p:ext uri="{BB962C8B-B14F-4D97-AF65-F5344CB8AC3E}">
-        <p14:creationId xmlns:p14="http://schemas.microsoft.com/office/powerpoint/2010/main" val="1115311843"/>
+        <p14:creationId xmlns:p14="http://schemas.microsoft.com/office/powerpoint/2010/main" val="2747596967"/>
       </p:ext>
     </p:extLst>
   </p:cSld>
@@ -5387,67 +6205,9 @@
           <a:chExt cx="0" cy="0"/>
         </a:xfrm>
       </p:grpSpPr>
-      <p:pic>
-        <p:nvPicPr>
-          <p:cNvPr id="112" name="Picture 6" descr="Picture 6"/>
-          <p:cNvPicPr>
-            <a:picLocks noChangeAspect="1"/>
-          </p:cNvPicPr>
-          <p:nvPr/>
-        </p:nvPicPr>
-        <p:blipFill>
-          <a:blip r:embed="rId2"/>
-          <a:stretch>
-            <a:fillRect/>
-          </a:stretch>
-        </p:blipFill>
-        <p:spPr>
-          <a:xfrm>
-            <a:off x="0" y="0"/>
-            <a:ext cx="9144000" cy="5143500"/>
-          </a:xfrm>
-          <a:prstGeom prst="rect">
-            <a:avLst/>
-          </a:prstGeom>
-          <a:ln w="12700">
-            <a:miter lim="400000"/>
-            <a:headEnd/>
-            <a:tailEnd/>
-          </a:ln>
-        </p:spPr>
-      </p:pic>
-      <p:pic>
-        <p:nvPicPr>
-          <p:cNvPr id="114" name="Picture 5" descr="Picture 5"/>
-          <p:cNvPicPr>
-            <a:picLocks noChangeAspect="1"/>
-          </p:cNvPicPr>
-          <p:nvPr/>
-        </p:nvPicPr>
-        <p:blipFill>
-          <a:blip r:embed="rId3"/>
-          <a:stretch>
-            <a:fillRect/>
-          </a:stretch>
-        </p:blipFill>
-        <p:spPr>
-          <a:xfrm>
-            <a:off x="469900" y="0"/>
-            <a:ext cx="4391984" cy="171450"/>
-          </a:xfrm>
-          <a:prstGeom prst="rect">
-            <a:avLst/>
-          </a:prstGeom>
-          <a:ln w="12700">
-            <a:miter lim="400000"/>
-            <a:headEnd/>
-            <a:tailEnd/>
-          </a:ln>
-        </p:spPr>
-      </p:pic>
       <p:sp>
         <p:nvSpPr>
-          <p:cNvPr id="3" name="Título 2"/>
+          <p:cNvPr id="6" name="Title 1"/>
           <p:cNvSpPr>
             <a:spLocks noGrp="1"/>
           </p:cNvSpPr>
@@ -5457,8 +6217,65 @@
         </p:nvSpPr>
         <p:spPr>
           <a:xfrm>
-            <a:off x="285751" y="2386770"/>
-            <a:ext cx="8615364" cy="1102519"/>
+            <a:off x="457200" y="205980"/>
+            <a:ext cx="8229600" cy="857251"/>
+          </a:xfrm>
+        </p:spPr>
+        <p:txBody>
+          <a:bodyPr>
+            <a:normAutofit/>
+          </a:bodyPr>
+          <a:lstStyle/>
+          <a:p>
+            <a:r>
+              <a:rPr lang="en-US" b="1" dirty="0" err="1">
+                <a:solidFill>
+                  <a:srgbClr val="0070C0"/>
+                </a:solidFill>
+              </a:rPr>
+              <a:t>Dinâmica</a:t>
+            </a:r>
+            <a:r>
+              <a:rPr lang="en-US" b="1" dirty="0">
+                <a:solidFill>
+                  <a:srgbClr val="0070C0"/>
+                </a:solidFill>
+              </a:rPr>
+              <a:t>/</a:t>
+            </a:r>
+            <a:r>
+              <a:rPr lang="en-US" b="1" dirty="0" err="1">
+                <a:solidFill>
+                  <a:srgbClr val="0070C0"/>
+                </a:solidFill>
+              </a:rPr>
+              <a:t>Atividades</a:t>
+            </a:r>
+            <a:r>
+              <a:rPr lang="en-US" b="1" dirty="0">
+                <a:solidFill>
+                  <a:srgbClr val="0070C0"/>
+                </a:solidFill>
+              </a:rPr>
+              <a:t> (AVA)</a:t>
+            </a:r>
+          </a:p>
+        </p:txBody>
+      </p:sp>
+      <p:sp>
+        <p:nvSpPr>
+          <p:cNvPr id="8" name="Text Placeholder 2"/>
+          <p:cNvSpPr>
+            <a:spLocks noGrp="1"/>
+          </p:cNvSpPr>
+          <p:nvPr>
+            <p:ph type="body" sz="half" idx="1"/>
+          </p:nvPr>
+        </p:nvSpPr>
+        <p:spPr>
+          <a:xfrm>
+            <a:off x="139472" y="1063230"/>
+            <a:ext cx="8865056" cy="3874290"/>
           </a:xfrm>
         </p:spPr>
         <p:txBody>
@@ -5467,371 +6284,540 @@
           </a:bodyPr>
           <a:lstStyle/>
           <a:p>
-            <a:r>
-              <a:rPr lang="pt-BR" sz="4800" b="1" dirty="0">
-                <a:solidFill>
-                  <a:schemeClr val="bg1"/>
-                </a:solidFill>
-              </a:rPr>
-              <a:t>Cloud Computer e </a:t>
-            </a:r>
-            <a:br>
-              <a:rPr lang="pt-BR" sz="4800" b="1" dirty="0">
-                <a:solidFill>
-                  <a:schemeClr val="bg1"/>
-                </a:solidFill>
-              </a:rPr>
-            </a:br>
-            <a:r>
-              <a:rPr lang="pt-BR" sz="4800" b="1" dirty="0">
-                <a:solidFill>
-                  <a:schemeClr val="bg1"/>
-                </a:solidFill>
-              </a:rPr>
-              <a:t>Web Services em Linux</a:t>
-            </a:r>
+            <a:pPr algn="just">
+              <a:buFontTx/>
+              <a:buChar char="-"/>
+            </a:pPr>
+            <a:r>
+              <a:rPr lang="pt-BR" sz="2000" b="1" dirty="0">
+                <a:latin typeface="Times New Roman" panose="02020603050405020304" pitchFamily="18" charset="0"/>
+                <a:cs typeface="Times New Roman" panose="02020603050405020304" pitchFamily="18" charset="0"/>
+              </a:rPr>
+              <a:t>Quiz Microsoft AZURE</a:t>
+            </a:r>
+          </a:p>
+          <a:p>
+            <a:pPr marL="457200" lvl="1" indent="0" algn="just">
+              <a:buNone/>
+            </a:pPr>
+            <a:r>
+              <a:rPr lang="pt-BR" sz="2000" dirty="0">
+                <a:latin typeface="Calibri" panose="020F0502020204030204" pitchFamily="34" charset="0"/>
+                <a:hlinkClick r:id="rId3"/>
+              </a:rPr>
+              <a:t>https://azurecharts.com/quiz</a:t>
+            </a:r>
+            <a:endParaRPr lang="pt-BR" sz="2000" dirty="0">
+              <a:latin typeface="Calibri" panose="020F0502020204030204" pitchFamily="34" charset="0"/>
+            </a:endParaRPr>
+          </a:p>
+          <a:p>
+            <a:pPr marL="457200" lvl="1" indent="0" algn="just">
+              <a:buNone/>
+            </a:pPr>
+            <a:r>
+              <a:rPr lang="pt-BR" sz="2000" dirty="0">
+                <a:latin typeface="Calibri" panose="020F0502020204030204" pitchFamily="34" charset="0"/>
+                <a:hlinkClick r:id="rId4"/>
+              </a:rPr>
+              <a:t>https://learn.microsoft.com/en-us/certifications/resources/az-900-sample-questions</a:t>
+            </a:r>
+            <a:endParaRPr lang="pt-BR" sz="2000" dirty="0">
+              <a:latin typeface="Calibri" panose="020F0502020204030204" pitchFamily="34" charset="0"/>
+            </a:endParaRPr>
+          </a:p>
+          <a:p>
+            <a:pPr marL="457200" lvl="1" indent="0" algn="just">
+              <a:buNone/>
+            </a:pPr>
+            <a:endParaRPr lang="pt-BR" sz="2000" dirty="0">
+              <a:latin typeface="Calibri" panose="020F0502020204030204" pitchFamily="34" charset="0"/>
+            </a:endParaRPr>
+          </a:p>
+          <a:p>
+            <a:pPr algn="just">
+              <a:buFontTx/>
+              <a:buChar char="-"/>
+            </a:pPr>
+            <a:r>
+              <a:rPr lang="pt-BR" sz="2000" b="1" dirty="0">
+                <a:latin typeface="Calibri" panose="020F0502020204030204" pitchFamily="34" charset="0"/>
+              </a:rPr>
+              <a:t>Registrar/Publicar domínio AZURE</a:t>
+            </a:r>
+          </a:p>
+          <a:p>
+            <a:pPr algn="just">
+              <a:buFont typeface="Wingdings" panose="05000000000000000000" pitchFamily="2" charset="2"/>
+              <a:buChar char="§"/>
+            </a:pPr>
+            <a:r>
+              <a:rPr lang="pt-BR" sz="2000" dirty="0">
+                <a:latin typeface="Calibri" panose="020F0502020204030204" pitchFamily="34" charset="0"/>
+              </a:rPr>
+              <a:t>Registro.br</a:t>
+            </a:r>
+          </a:p>
+          <a:p>
+            <a:pPr algn="just">
+              <a:buFont typeface="Wingdings" panose="05000000000000000000" pitchFamily="2" charset="2"/>
+              <a:buChar char="§"/>
+            </a:pPr>
+            <a:r>
+              <a:rPr lang="pt-BR" sz="2000" dirty="0">
+                <a:latin typeface="Calibri" panose="020F0502020204030204" pitchFamily="34" charset="0"/>
+              </a:rPr>
+              <a:t>AZURE DNS</a:t>
+            </a:r>
+          </a:p>
+          <a:p>
+            <a:pPr algn="just">
+              <a:buFontTx/>
+              <a:buChar char="-"/>
+            </a:pPr>
+            <a:endParaRPr lang="pt-BR" sz="2000" b="1" dirty="0">
+              <a:latin typeface="Calibri" panose="020F0502020204030204" pitchFamily="34" charset="0"/>
+            </a:endParaRPr>
+          </a:p>
+          <a:p>
+            <a:pPr algn="just">
+              <a:buFontTx/>
+              <a:buChar char="-"/>
+            </a:pPr>
+            <a:r>
+              <a:rPr lang="pt-BR" sz="2000" b="1" dirty="0">
+                <a:latin typeface="Calibri" panose="020F0502020204030204" pitchFamily="34" charset="0"/>
+              </a:rPr>
+              <a:t>Dúvidas </a:t>
+            </a:r>
+            <a:r>
+              <a:rPr lang="pt-BR" sz="2000" b="1" dirty="0" err="1">
+                <a:latin typeface="Calibri" panose="020F0502020204030204" pitchFamily="34" charset="0"/>
+              </a:rPr>
+              <a:t>MongoDB</a:t>
+            </a:r>
+            <a:r>
+              <a:rPr lang="pt-BR" sz="2000" b="1" dirty="0">
+                <a:latin typeface="Calibri" panose="020F0502020204030204" pitchFamily="34" charset="0"/>
+              </a:rPr>
+              <a:t> Atlas/</a:t>
+            </a:r>
+            <a:r>
+              <a:rPr lang="pt-BR" sz="2000" b="1">
+                <a:latin typeface="Calibri" panose="020F0502020204030204" pitchFamily="34" charset="0"/>
+              </a:rPr>
+              <a:t>Compass IDE </a:t>
+            </a:r>
+            <a:r>
+              <a:rPr lang="pt-BR" sz="2000" b="1" dirty="0">
+                <a:latin typeface="Calibri" panose="020F0502020204030204" pitchFamily="34" charset="0"/>
+              </a:rPr>
+              <a:t>(</a:t>
+            </a:r>
+            <a:r>
+              <a:rPr lang="pt-BR" sz="2000" b="1" dirty="0">
+                <a:solidFill>
+                  <a:srgbClr val="FF0000"/>
+                </a:solidFill>
+                <a:latin typeface="Calibri" panose="020F0502020204030204" pitchFamily="34" charset="0"/>
+              </a:rPr>
+              <a:t>Acesso Remoto</a:t>
+            </a:r>
+            <a:r>
+              <a:rPr lang="pt-BR" sz="2000" b="1" dirty="0">
+                <a:latin typeface="Calibri" panose="020F0502020204030204" pitchFamily="34" charset="0"/>
+              </a:rPr>
+              <a:t>)</a:t>
+            </a:r>
+            <a:endParaRPr lang="pt-BR" sz="2000" dirty="0">
+              <a:latin typeface="Calibri" panose="020F0502020204030204" pitchFamily="34" charset="0"/>
+            </a:endParaRPr>
+          </a:p>
+        </p:txBody>
+      </p:sp>
+    </p:spTree>
+    <p:extLst>
+      <p:ext uri="{BB962C8B-B14F-4D97-AF65-F5344CB8AC3E}">
+        <p14:creationId xmlns:p14="http://schemas.microsoft.com/office/powerpoint/2010/main" val="2470652989"/>
+      </p:ext>
+    </p:extLst>
+  </p:cSld>
+  <p:clrMapOvr>
+    <a:masterClrMapping/>
+  </p:clrMapOvr>
+  <p:transition spd="med"/>
+</p:sld>
+</file>
+
+<file path=ppt/slides/slide9.xml><?xml version="1.0" encoding="utf-8"?>
+<p:sld xmlns:a="http://schemas.openxmlformats.org/drawingml/2006/main" xmlns:r="http://schemas.openxmlformats.org/officeDocument/2006/relationships" xmlns:p="http://schemas.openxmlformats.org/presentationml/2006/main">
+  <p:cSld>
+    <p:spTree>
+      <p:nvGrpSpPr>
+        <p:cNvPr id="1" name=""/>
+        <p:cNvGrpSpPr/>
+        <p:nvPr/>
+      </p:nvGrpSpPr>
+      <p:grpSpPr>
+        <a:xfrm>
+          <a:off x="0" y="0"/>
+          <a:ext cx="0" cy="0"/>
+          <a:chOff x="0" y="0"/>
+          <a:chExt cx="0" cy="0"/>
+        </a:xfrm>
+      </p:grpSpPr>
+      <p:sp>
+        <p:nvSpPr>
+          <p:cNvPr id="6" name="Title 1"/>
+          <p:cNvSpPr>
+            <a:spLocks noGrp="1"/>
+          </p:cNvSpPr>
+          <p:nvPr>
+            <p:ph type="title"/>
+          </p:nvPr>
+        </p:nvSpPr>
+        <p:spPr>
+          <a:xfrm>
+            <a:off x="457200" y="205980"/>
+            <a:ext cx="8229600" cy="857251"/>
+          </a:xfrm>
+        </p:spPr>
+        <p:txBody>
+          <a:bodyPr>
+            <a:normAutofit/>
+          </a:bodyPr>
+          <a:lstStyle/>
+          <a:p>
+            <a:r>
+              <a:rPr lang="en-US" b="1" dirty="0" err="1">
+                <a:solidFill>
+                  <a:srgbClr val="0070C0"/>
+                </a:solidFill>
+              </a:rPr>
+              <a:t>Referências</a:t>
+            </a:r>
+            <a:r>
+              <a:rPr lang="en-US" b="1" dirty="0">
+                <a:solidFill>
+                  <a:srgbClr val="0070C0"/>
+                </a:solidFill>
+              </a:rPr>
+              <a:t> </a:t>
+            </a:r>
+            <a:r>
+              <a:rPr lang="en-US" b="1" dirty="0" err="1">
+                <a:solidFill>
+                  <a:srgbClr val="0070C0"/>
+                </a:solidFill>
+              </a:rPr>
+              <a:t>Bibliográficas</a:t>
+            </a:r>
+            <a:endParaRPr lang="en-US" b="1" dirty="0">
+              <a:solidFill>
+                <a:srgbClr val="0070C0"/>
+              </a:solidFill>
+            </a:endParaRPr>
           </a:p>
         </p:txBody>
       </p:sp>
       <p:sp>
         <p:nvSpPr>
-          <p:cNvPr id="6" name="Título 2"/>
-          <p:cNvSpPr txBox="1"/>
-          <p:nvPr/>
+          <p:cNvPr id="8" name="Text Placeholder 2"/>
+          <p:cNvSpPr>
+            <a:spLocks noGrp="1"/>
+          </p:cNvSpPr>
+          <p:nvPr>
+            <p:ph type="body" sz="half" idx="1"/>
+          </p:nvPr>
         </p:nvSpPr>
         <p:spPr>
           <a:xfrm>
-            <a:off x="975683" y="3866663"/>
-            <a:ext cx="7772400" cy="1102519"/>
+            <a:off x="142865" y="1200151"/>
+            <a:ext cx="8865056" cy="3394472"/>
           </a:xfrm>
-          <a:prstGeom prst="rect">
-            <a:avLst/>
-          </a:prstGeom>
-          <a:ln w="12700">
-            <a:miter lim="400000"/>
-          </a:ln>
         </p:spPr>
         <p:txBody>
-          <a:bodyPr lIns="45718" tIns="45718" rIns="45718" bIns="45718" anchor="ctr">
+          <a:bodyPr>
             <a:noAutofit/>
           </a:bodyPr>
-          <a:lstStyle>
-            <a:lvl1pPr marL="0" marR="0" indent="0" algn="ctr" defTabSz="457200" rtl="0" latinLnBrk="0">
-              <a:lnSpc>
-                <a:spcPct val="100000"/>
-              </a:lnSpc>
-              <a:spcBef>
-                <a:spcPts val="0"/>
-              </a:spcBef>
-              <a:spcAft>
-                <a:spcPts val="0"/>
-              </a:spcAft>
-              <a:buClrTx/>
-              <a:buSzTx/>
-              <a:buFontTx/>
+          <a:lstStyle/>
+          <a:p>
+            <a:pPr marL="0" indent="0" algn="just">
               <a:buNone/>
-              <a:defRPr sz="4400" b="0" i="0" u="none" strike="noStrike" cap="none" spc="0" baseline="0">
-                <a:ln>
-                  <a:noFill/>
-                </a:ln>
-                <a:solidFill>
-                  <a:srgbClr val="000000"/>
-                </a:solidFill>
-                <a:uFillTx/>
-                <a:latin typeface="+mj-lt"/>
-                <a:ea typeface="+mj-ea"/>
-                <a:cs typeface="+mj-cs"/>
-                <a:sym typeface="Calibri"/>
-              </a:defRPr>
-            </a:lvl1pPr>
-            <a:lvl2pPr marL="0" marR="0" indent="0" algn="ctr" defTabSz="457200" rtl="0" latinLnBrk="0">
-              <a:lnSpc>
-                <a:spcPct val="100000"/>
-              </a:lnSpc>
-              <a:spcBef>
-                <a:spcPts val="0"/>
-              </a:spcBef>
-              <a:spcAft>
-                <a:spcPts val="0"/>
-              </a:spcAft>
-              <a:buClrTx/>
-              <a:buSzTx/>
-              <a:buFontTx/>
+            </a:pPr>
+            <a:r>
+              <a:rPr lang="pt-BR" sz="2000" dirty="0">
+                <a:solidFill>
+                  <a:schemeClr val="tx1"/>
+                </a:solidFill>
+                <a:latin typeface="Times New Roman" panose="02020603050405020304" pitchFamily="18" charset="0"/>
+                <a:cs typeface="Times New Roman" panose="02020603050405020304" pitchFamily="18" charset="0"/>
+              </a:rPr>
+              <a:t>[1] </a:t>
+            </a:r>
+            <a:r>
+              <a:rPr lang="en-US" sz="2000" b="1" dirty="0">
+                <a:solidFill>
+                  <a:srgbClr val="FF0000"/>
+                </a:solidFill>
+                <a:latin typeface="Times New Roman" panose="02020603050405020304" pitchFamily="18" charset="0"/>
+                <a:cs typeface="Times New Roman" panose="02020603050405020304" pitchFamily="18" charset="0"/>
+              </a:rPr>
+              <a:t>AZURE, </a:t>
+            </a:r>
+            <a:r>
+              <a:rPr lang="en-US" sz="2000" b="1" dirty="0" err="1">
+                <a:solidFill>
+                  <a:srgbClr val="FF0000"/>
+                </a:solidFill>
+                <a:latin typeface="Times New Roman" panose="02020603050405020304" pitchFamily="18" charset="0"/>
+                <a:cs typeface="Times New Roman" panose="02020603050405020304" pitchFamily="18" charset="0"/>
+              </a:rPr>
+              <a:t>Microsft</a:t>
+            </a:r>
+            <a:r>
+              <a:rPr lang="en-US" sz="2000" dirty="0">
+                <a:solidFill>
+                  <a:schemeClr val="tx1"/>
+                </a:solidFill>
+                <a:latin typeface="Times New Roman" panose="02020603050405020304" pitchFamily="18" charset="0"/>
+                <a:cs typeface="Times New Roman" panose="02020603050405020304" pitchFamily="18" charset="0"/>
+              </a:rPr>
+              <a:t>. Microsoft azure. </a:t>
+            </a:r>
+            <a:r>
+              <a:rPr lang="en-US" sz="2000" dirty="0" err="1">
+                <a:solidFill>
+                  <a:schemeClr val="tx1"/>
+                </a:solidFill>
+                <a:latin typeface="Times New Roman" panose="02020603050405020304" pitchFamily="18" charset="0"/>
+                <a:cs typeface="Times New Roman" panose="02020603050405020304" pitchFamily="18" charset="0"/>
+              </a:rPr>
+              <a:t>línea</a:t>
+            </a:r>
+            <a:r>
+              <a:rPr lang="en-US" sz="2000" dirty="0">
+                <a:solidFill>
+                  <a:schemeClr val="tx1"/>
+                </a:solidFill>
+                <a:latin typeface="Times New Roman" panose="02020603050405020304" pitchFamily="18" charset="0"/>
+                <a:cs typeface="Times New Roman" panose="02020603050405020304" pitchFamily="18" charset="0"/>
+              </a:rPr>
+              <a:t>]. Available: https://docs. </a:t>
+            </a:r>
+            <a:r>
+              <a:rPr lang="en-US" sz="2000" dirty="0" err="1">
+                <a:solidFill>
+                  <a:schemeClr val="tx1"/>
+                </a:solidFill>
+                <a:latin typeface="Times New Roman" panose="02020603050405020304" pitchFamily="18" charset="0"/>
+                <a:cs typeface="Times New Roman" panose="02020603050405020304" pitchFamily="18" charset="0"/>
+              </a:rPr>
+              <a:t>microsoft</a:t>
+            </a:r>
+            <a:r>
+              <a:rPr lang="en-US" sz="2000" dirty="0">
+                <a:solidFill>
+                  <a:schemeClr val="tx1"/>
+                </a:solidFill>
+                <a:latin typeface="Times New Roman" panose="02020603050405020304" pitchFamily="18" charset="0"/>
+                <a:cs typeface="Times New Roman" panose="02020603050405020304" pitchFamily="18" charset="0"/>
+              </a:rPr>
+              <a:t>. com/es-es/azure/virtual-machines/</a:t>
+            </a:r>
+            <a:r>
+              <a:rPr lang="en-US" sz="2000" dirty="0" err="1">
+                <a:solidFill>
+                  <a:schemeClr val="tx1"/>
+                </a:solidFill>
+                <a:latin typeface="Times New Roman" panose="02020603050405020304" pitchFamily="18" charset="0"/>
+                <a:cs typeface="Times New Roman" panose="02020603050405020304" pitchFamily="18" charset="0"/>
+              </a:rPr>
+              <a:t>linux</a:t>
+            </a:r>
+            <a:r>
+              <a:rPr lang="en-US" sz="2000" dirty="0">
+                <a:solidFill>
+                  <a:schemeClr val="tx1"/>
+                </a:solidFill>
+                <a:latin typeface="Times New Roman" panose="02020603050405020304" pitchFamily="18" charset="0"/>
+                <a:cs typeface="Times New Roman" panose="02020603050405020304" pitchFamily="18" charset="0"/>
+              </a:rPr>
+              <a:t>/quick-</a:t>
+            </a:r>
+            <a:r>
+              <a:rPr lang="en-US" sz="2000" dirty="0" err="1">
+                <a:solidFill>
+                  <a:schemeClr val="tx1"/>
+                </a:solidFill>
+                <a:latin typeface="Times New Roman" panose="02020603050405020304" pitchFamily="18" charset="0"/>
+                <a:cs typeface="Times New Roman" panose="02020603050405020304" pitchFamily="18" charset="0"/>
+              </a:rPr>
+              <a:t>createportal</a:t>
+            </a:r>
+            <a:r>
+              <a:rPr lang="en-US" sz="2000" dirty="0">
+                <a:solidFill>
+                  <a:schemeClr val="tx1"/>
+                </a:solidFill>
+                <a:latin typeface="Times New Roman" panose="02020603050405020304" pitchFamily="18" charset="0"/>
+                <a:cs typeface="Times New Roman" panose="02020603050405020304" pitchFamily="18" charset="0"/>
+              </a:rPr>
+              <a:t>.[Último </a:t>
+            </a:r>
+            <a:r>
+              <a:rPr lang="en-US" sz="2000" dirty="0" err="1">
+                <a:solidFill>
+                  <a:schemeClr val="tx1"/>
+                </a:solidFill>
+                <a:latin typeface="Times New Roman" panose="02020603050405020304" pitchFamily="18" charset="0"/>
+                <a:cs typeface="Times New Roman" panose="02020603050405020304" pitchFamily="18" charset="0"/>
+              </a:rPr>
+              <a:t>acceso</a:t>
+            </a:r>
+            <a:r>
+              <a:rPr lang="en-US" sz="2000" dirty="0">
+                <a:solidFill>
+                  <a:schemeClr val="tx1"/>
+                </a:solidFill>
+                <a:latin typeface="Times New Roman" panose="02020603050405020304" pitchFamily="18" charset="0"/>
+                <a:cs typeface="Times New Roman" panose="02020603050405020304" pitchFamily="18" charset="0"/>
+              </a:rPr>
+              <a:t>: 10 </a:t>
+            </a:r>
+            <a:r>
+              <a:rPr lang="en-US" sz="2000" dirty="0" err="1">
+                <a:solidFill>
+                  <a:schemeClr val="tx1"/>
+                </a:solidFill>
+                <a:latin typeface="Times New Roman" panose="02020603050405020304" pitchFamily="18" charset="0"/>
+                <a:cs typeface="Times New Roman" panose="02020603050405020304" pitchFamily="18" charset="0"/>
+              </a:rPr>
+              <a:t>Diciembre</a:t>
+            </a:r>
+            <a:r>
+              <a:rPr lang="en-US" sz="2000" dirty="0">
+                <a:solidFill>
+                  <a:schemeClr val="tx1"/>
+                </a:solidFill>
+                <a:latin typeface="Times New Roman" panose="02020603050405020304" pitchFamily="18" charset="0"/>
+                <a:cs typeface="Times New Roman" panose="02020603050405020304" pitchFamily="18" charset="0"/>
+              </a:rPr>
+              <a:t> 2017], 2016.</a:t>
+            </a:r>
+          </a:p>
+          <a:p>
+            <a:pPr marL="0" indent="0" algn="just">
               <a:buNone/>
-              <a:defRPr sz="4400" b="0" i="0" u="none" strike="noStrike" cap="none" spc="0" baseline="0">
-                <a:ln>
-                  <a:noFill/>
-                </a:ln>
-                <a:solidFill>
-                  <a:srgbClr val="000000"/>
-                </a:solidFill>
-                <a:uFillTx/>
-                <a:latin typeface="+mj-lt"/>
-                <a:ea typeface="+mj-ea"/>
-                <a:cs typeface="+mj-cs"/>
-                <a:sym typeface="Calibri"/>
-              </a:defRPr>
-            </a:lvl2pPr>
-            <a:lvl3pPr marL="0" marR="0" indent="0" algn="ctr" defTabSz="457200" rtl="0" latinLnBrk="0">
-              <a:lnSpc>
-                <a:spcPct val="100000"/>
-              </a:lnSpc>
-              <a:spcBef>
-                <a:spcPts val="0"/>
-              </a:spcBef>
-              <a:spcAft>
-                <a:spcPts val="0"/>
-              </a:spcAft>
-              <a:buClrTx/>
-              <a:buSzTx/>
-              <a:buFontTx/>
+            </a:pPr>
+            <a:endParaRPr lang="en-US" sz="2000" dirty="0">
+              <a:solidFill>
+                <a:schemeClr val="tx1"/>
+              </a:solidFill>
+              <a:latin typeface="Times New Roman" panose="02020603050405020304" pitchFamily="18" charset="0"/>
+              <a:cs typeface="Times New Roman" panose="02020603050405020304" pitchFamily="18" charset="0"/>
+            </a:endParaRPr>
+          </a:p>
+          <a:p>
+            <a:pPr marL="0" indent="0" algn="just">
               <a:buNone/>
-              <a:defRPr sz="4400" b="0" i="0" u="none" strike="noStrike" cap="none" spc="0" baseline="0">
-                <a:ln>
-                  <a:noFill/>
-                </a:ln>
-                <a:solidFill>
-                  <a:srgbClr val="000000"/>
-                </a:solidFill>
-                <a:uFillTx/>
-                <a:latin typeface="+mj-lt"/>
-                <a:ea typeface="+mj-ea"/>
-                <a:cs typeface="+mj-cs"/>
-                <a:sym typeface="Calibri"/>
-              </a:defRPr>
-            </a:lvl3pPr>
-            <a:lvl4pPr marL="0" marR="0" indent="0" algn="ctr" defTabSz="457200" rtl="0" latinLnBrk="0">
-              <a:lnSpc>
-                <a:spcPct val="100000"/>
-              </a:lnSpc>
-              <a:spcBef>
-                <a:spcPts val="0"/>
-              </a:spcBef>
-              <a:spcAft>
-                <a:spcPts val="0"/>
-              </a:spcAft>
-              <a:buClrTx/>
-              <a:buSzTx/>
-              <a:buFontTx/>
+            </a:pPr>
+            <a:r>
+              <a:rPr lang="pt-BR" sz="2000" dirty="0">
+                <a:solidFill>
+                  <a:schemeClr val="tx1"/>
+                </a:solidFill>
+                <a:latin typeface="Times New Roman" panose="02020603050405020304" pitchFamily="18" charset="0"/>
+                <a:cs typeface="Times New Roman" panose="02020603050405020304" pitchFamily="18" charset="0"/>
+              </a:rPr>
+              <a:t>[2] </a:t>
+            </a:r>
+            <a:r>
+              <a:rPr lang="en-US" sz="2000" b="1" dirty="0">
+                <a:solidFill>
+                  <a:srgbClr val="FF0000"/>
+                </a:solidFill>
+                <a:latin typeface="Times New Roman" panose="02020603050405020304" pitchFamily="18" charset="0"/>
+                <a:cs typeface="Times New Roman" panose="02020603050405020304" pitchFamily="18" charset="0"/>
+              </a:rPr>
+              <a:t>COPELAND, Marshall et al</a:t>
+            </a:r>
+            <a:r>
+              <a:rPr lang="en-US" sz="2000" dirty="0">
+                <a:solidFill>
+                  <a:schemeClr val="tx1"/>
+                </a:solidFill>
+                <a:latin typeface="Times New Roman" panose="02020603050405020304" pitchFamily="18" charset="0"/>
+                <a:cs typeface="Times New Roman" panose="02020603050405020304" pitchFamily="18" charset="0"/>
+              </a:rPr>
+              <a:t>. Microsoft azure and cloud computing. Microsoft Azure: Planning, Deploying, and Managing Your Data center in the Cloud, p. 3-26, 2015.</a:t>
+            </a:r>
+          </a:p>
+          <a:p>
+            <a:pPr marL="0" indent="0" algn="just">
               <a:buNone/>
-              <a:defRPr sz="4400" b="0" i="0" u="none" strike="noStrike" cap="none" spc="0" baseline="0">
-                <a:ln>
-                  <a:noFill/>
-                </a:ln>
-                <a:solidFill>
-                  <a:srgbClr val="000000"/>
-                </a:solidFill>
-                <a:uFillTx/>
-                <a:latin typeface="+mj-lt"/>
-                <a:ea typeface="+mj-ea"/>
-                <a:cs typeface="+mj-cs"/>
-                <a:sym typeface="Calibri"/>
-              </a:defRPr>
-            </a:lvl4pPr>
-            <a:lvl5pPr marL="0" marR="0" indent="0" algn="ctr" defTabSz="457200" rtl="0" latinLnBrk="0">
-              <a:lnSpc>
-                <a:spcPct val="100000"/>
-              </a:lnSpc>
-              <a:spcBef>
-                <a:spcPts val="0"/>
-              </a:spcBef>
-              <a:spcAft>
-                <a:spcPts val="0"/>
-              </a:spcAft>
-              <a:buClrTx/>
-              <a:buSzTx/>
-              <a:buFontTx/>
+            </a:pPr>
+            <a:endParaRPr lang="pt-BR" sz="2000" dirty="0">
+              <a:solidFill>
+                <a:schemeClr val="tx1"/>
+              </a:solidFill>
+              <a:latin typeface="Times New Roman" panose="02020603050405020304" pitchFamily="18" charset="0"/>
+              <a:cs typeface="Times New Roman" panose="02020603050405020304" pitchFamily="18" charset="0"/>
+            </a:endParaRPr>
+          </a:p>
+          <a:p>
+            <a:pPr marL="0" indent="0" algn="just">
               <a:buNone/>
-              <a:defRPr sz="4400" b="0" i="0" u="none" strike="noStrike" cap="none" spc="0" baseline="0">
-                <a:ln>
-                  <a:noFill/>
-                </a:ln>
-                <a:solidFill>
-                  <a:srgbClr val="000000"/>
-                </a:solidFill>
-                <a:uFillTx/>
-                <a:latin typeface="+mj-lt"/>
-                <a:ea typeface="+mj-ea"/>
-                <a:cs typeface="+mj-cs"/>
-                <a:sym typeface="Calibri"/>
-              </a:defRPr>
-            </a:lvl5pPr>
-            <a:lvl6pPr marL="0" marR="0" indent="0" algn="ctr" defTabSz="457200" rtl="0" latinLnBrk="0">
-              <a:lnSpc>
-                <a:spcPct val="100000"/>
-              </a:lnSpc>
-              <a:spcBef>
-                <a:spcPts val="0"/>
-              </a:spcBef>
-              <a:spcAft>
-                <a:spcPts val="0"/>
-              </a:spcAft>
-              <a:buClrTx/>
-              <a:buSzTx/>
-              <a:buFontTx/>
-              <a:buNone/>
-              <a:defRPr sz="4400" b="0" i="0" u="none" strike="noStrike" cap="none" spc="0" baseline="0">
-                <a:ln>
-                  <a:noFill/>
-                </a:ln>
-                <a:solidFill>
-                  <a:srgbClr val="000000"/>
-                </a:solidFill>
-                <a:uFillTx/>
-                <a:latin typeface="+mj-lt"/>
-                <a:ea typeface="+mj-ea"/>
-                <a:cs typeface="+mj-cs"/>
-                <a:sym typeface="Calibri"/>
-              </a:defRPr>
-            </a:lvl6pPr>
-            <a:lvl7pPr marL="0" marR="0" indent="0" algn="ctr" defTabSz="457200" rtl="0" latinLnBrk="0">
-              <a:lnSpc>
-                <a:spcPct val="100000"/>
-              </a:lnSpc>
-              <a:spcBef>
-                <a:spcPts val="0"/>
-              </a:spcBef>
-              <a:spcAft>
-                <a:spcPts val="0"/>
-              </a:spcAft>
-              <a:buClrTx/>
-              <a:buSzTx/>
-              <a:buFontTx/>
-              <a:buNone/>
-              <a:defRPr sz="4400" b="0" i="0" u="none" strike="noStrike" cap="none" spc="0" baseline="0">
-                <a:ln>
-                  <a:noFill/>
-                </a:ln>
-                <a:solidFill>
-                  <a:srgbClr val="000000"/>
-                </a:solidFill>
-                <a:uFillTx/>
-                <a:latin typeface="+mj-lt"/>
-                <a:ea typeface="+mj-ea"/>
-                <a:cs typeface="+mj-cs"/>
-                <a:sym typeface="Calibri"/>
-              </a:defRPr>
-            </a:lvl7pPr>
-            <a:lvl8pPr marL="0" marR="0" indent="0" algn="ctr" defTabSz="457200" rtl="0" latinLnBrk="0">
-              <a:lnSpc>
-                <a:spcPct val="100000"/>
-              </a:lnSpc>
-              <a:spcBef>
-                <a:spcPts val="0"/>
-              </a:spcBef>
-              <a:spcAft>
-                <a:spcPts val="0"/>
-              </a:spcAft>
-              <a:buClrTx/>
-              <a:buSzTx/>
-              <a:buFontTx/>
-              <a:buNone/>
-              <a:defRPr sz="4400" b="0" i="0" u="none" strike="noStrike" cap="none" spc="0" baseline="0">
-                <a:ln>
-                  <a:noFill/>
-                </a:ln>
-                <a:solidFill>
-                  <a:srgbClr val="000000"/>
-                </a:solidFill>
-                <a:uFillTx/>
-                <a:latin typeface="+mj-lt"/>
-                <a:ea typeface="+mj-ea"/>
-                <a:cs typeface="+mj-cs"/>
-                <a:sym typeface="Calibri"/>
-              </a:defRPr>
-            </a:lvl8pPr>
-            <a:lvl9pPr marL="0" marR="0" indent="0" algn="ctr" defTabSz="457200" rtl="0" latinLnBrk="0">
-              <a:lnSpc>
-                <a:spcPct val="100000"/>
-              </a:lnSpc>
-              <a:spcBef>
-                <a:spcPts val="0"/>
-              </a:spcBef>
-              <a:spcAft>
-                <a:spcPts val="0"/>
-              </a:spcAft>
-              <a:buClrTx/>
-              <a:buSzTx/>
-              <a:buFontTx/>
-              <a:buNone/>
-              <a:defRPr sz="4400" b="0" i="0" u="none" strike="noStrike" cap="none" spc="0" baseline="0">
-                <a:ln>
-                  <a:noFill/>
-                </a:ln>
-                <a:solidFill>
-                  <a:srgbClr val="000000"/>
-                </a:solidFill>
-                <a:uFillTx/>
-                <a:latin typeface="+mj-lt"/>
-                <a:ea typeface="+mj-ea"/>
-                <a:cs typeface="+mj-cs"/>
-                <a:sym typeface="Calibri"/>
-              </a:defRPr>
-            </a:lvl9pPr>
-          </a:lstStyle>
-          <a:p>
-            <a:pPr algn="r" hangingPunct="1"/>
-            <a:r>
-              <a:rPr lang="pt-BR" sz="2000" b="1" dirty="0">
-                <a:solidFill>
-                  <a:schemeClr val="bg1"/>
-                </a:solidFill>
-              </a:rPr>
-              <a:t>Professor </a:t>
-            </a:r>
-            <a:r>
-              <a:rPr lang="pt-BR" sz="2000" b="1">
-                <a:solidFill>
-                  <a:schemeClr val="bg1"/>
-                </a:solidFill>
-              </a:rPr>
-              <a:t>M.Sc</a:t>
-            </a:r>
-            <a:r>
-              <a:rPr lang="pt-BR" sz="2000" b="1" dirty="0">
-                <a:solidFill>
-                  <a:schemeClr val="bg1"/>
-                </a:solidFill>
-              </a:rPr>
-              <a:t>. Heleno Cardoso</a:t>
-            </a:r>
+              <a:tabLst>
+                <a:tab pos="457200" algn="l"/>
+              </a:tabLst>
+            </a:pPr>
+            <a:r>
+              <a:rPr lang="pt-BR" sz="2000" dirty="0">
+                <a:solidFill>
+                  <a:schemeClr val="tx1"/>
+                </a:solidFill>
+                <a:latin typeface="Times New Roman" panose="02020603050405020304" pitchFamily="18" charset="0"/>
+                <a:cs typeface="Times New Roman" panose="02020603050405020304" pitchFamily="18" charset="0"/>
+              </a:rPr>
+              <a:t>[3] </a:t>
+            </a:r>
+            <a:r>
+              <a:rPr lang="en-US" sz="2000" b="1" dirty="0">
+                <a:solidFill>
+                  <a:srgbClr val="FF0000"/>
+                </a:solidFill>
+                <a:latin typeface="Times New Roman" panose="02020603050405020304" pitchFamily="18" charset="0"/>
+                <a:cs typeface="Times New Roman" panose="02020603050405020304" pitchFamily="18" charset="0"/>
+              </a:rPr>
+              <a:t>CHAPPELL, David et al</a:t>
+            </a:r>
+            <a:r>
+              <a:rPr lang="en-US" sz="2000" dirty="0">
+                <a:solidFill>
+                  <a:schemeClr val="tx1"/>
+                </a:solidFill>
+                <a:latin typeface="Times New Roman" panose="02020603050405020304" pitchFamily="18" charset="0"/>
+                <a:cs typeface="Times New Roman" panose="02020603050405020304" pitchFamily="18" charset="0"/>
+              </a:rPr>
+              <a:t>. Introducing the windows azure platform. David Chappell &amp; Associates White Paper, 2010.</a:t>
+            </a:r>
+            <a:endParaRPr lang="pt-BR" sz="2000" dirty="0">
+              <a:solidFill>
+                <a:schemeClr val="tx1"/>
+              </a:solidFill>
+              <a:latin typeface="Times New Roman" panose="02020603050405020304" pitchFamily="18" charset="0"/>
+              <a:cs typeface="Times New Roman" panose="02020603050405020304" pitchFamily="18" charset="0"/>
+            </a:endParaRPr>
           </a:p>
         </p:txBody>
       </p:sp>
-      <p:pic>
-        <p:nvPicPr>
-          <p:cNvPr id="2" name="Google Shape;62;p1" descr="Imagem">
-            <a:extLst>
-              <a:ext uri="{FF2B5EF4-FFF2-40B4-BE49-F238E27FC236}">
-                <a16:creationId xmlns:a16="http://schemas.microsoft.com/office/drawing/2014/main" id="{9C895622-2963-024D-634E-EA58F5381D06}"/>
-              </a:ext>
-            </a:extLst>
-          </p:cNvPr>
-          <p:cNvPicPr preferRelativeResize="0"/>
-          <p:nvPr/>
-        </p:nvPicPr>
-        <p:blipFill rotWithShape="1">
-          <a:blip r:embed="rId4">
-            <a:alphaModFix/>
-          </a:blip>
-          <a:srcRect/>
-          <a:stretch/>
-        </p:blipFill>
-        <p:spPr>
-          <a:xfrm>
-            <a:off x="469898" y="343798"/>
-            <a:ext cx="2858518" cy="1338697"/>
-          </a:xfrm>
-          <a:prstGeom prst="rect">
-            <a:avLst/>
-          </a:prstGeom>
-          <a:noFill/>
-          <a:ln>
-            <a:noFill/>
-          </a:ln>
-        </p:spPr>
-      </p:pic>
     </p:spTree>
+    <p:extLst>
+      <p:ext uri="{BB962C8B-B14F-4D97-AF65-F5344CB8AC3E}">
+        <p14:creationId xmlns:p14="http://schemas.microsoft.com/office/powerpoint/2010/main" val="1115311843"/>
+      </p:ext>
+    </p:extLst>
   </p:cSld>
   <p:clrMapOvr>
     <a:masterClrMapping/>

</xml_diff>